<commit_message>
Příklady na optimalizaci dotazů EF 6
</commit_message>
<xml_diff>
--- a/ef6/performance-tips/ef-6-performance.pptx
+++ b/ef6/performance-tips/ef-6-performance.pptx
@@ -5,7 +5,7 @@
     <p:sldMasterId id="2147483672" r:id="rId1"/>
   </p:sldMasterIdLst>
   <p:notesMasterIdLst>
-    <p:notesMasterId r:id="rId25"/>
+    <p:notesMasterId r:id="rId29"/>
   </p:notesMasterIdLst>
   <p:sldIdLst>
     <p:sldId id="259" r:id="rId2"/>
@@ -29,8 +29,12 @@
     <p:sldId id="453" r:id="rId20"/>
     <p:sldId id="451" r:id="rId21"/>
     <p:sldId id="449" r:id="rId22"/>
-    <p:sldId id="450" r:id="rId23"/>
-    <p:sldId id="427" r:id="rId24"/>
+    <p:sldId id="454" r:id="rId23"/>
+    <p:sldId id="455" r:id="rId24"/>
+    <p:sldId id="456" r:id="rId25"/>
+    <p:sldId id="457" r:id="rId26"/>
+    <p:sldId id="450" r:id="rId27"/>
+    <p:sldId id="427" r:id="rId28"/>
   </p:sldIdLst>
   <p:sldSz cx="12192000" cy="6858000"/>
   <p:notesSz cx="6858000" cy="9144000"/>
@@ -219,7 +223,7 @@
           <a:p>
             <a:fld id="{A4B69E74-2EDE-477B-8DEF-6C0B6D24D8DC}" type="datetimeFigureOut">
               <a:rPr lang="cs-CZ" smtClean="0"/>
-              <a:t>06.01.2019</a:t>
+              <a:t>07.01.2019</a:t>
             </a:fld>
             <a:endParaRPr lang="cs-CZ"/>
           </a:p>
@@ -618,7 +622,7 @@
           <a:p>
             <a:fld id="{39314CEF-CB52-4A5E-BFDC-3C6F3F58A831}" type="datetimeFigureOut">
               <a:rPr lang="en-US" smtClean="0"/>
-              <a:t>1/6/2019</a:t>
+              <a:t>1/7/2019</a:t>
             </a:fld>
             <a:endParaRPr lang="en-US"/>
           </a:p>
@@ -788,7 +792,7 @@
           <a:p>
             <a:fld id="{39314CEF-CB52-4A5E-BFDC-3C6F3F58A831}" type="datetimeFigureOut">
               <a:rPr lang="en-US" smtClean="0"/>
-              <a:t>1/6/2019</a:t>
+              <a:t>1/7/2019</a:t>
             </a:fld>
             <a:endParaRPr lang="en-US"/>
           </a:p>
@@ -968,7 +972,7 @@
           <a:p>
             <a:fld id="{39314CEF-CB52-4A5E-BFDC-3C6F3F58A831}" type="datetimeFigureOut">
               <a:rPr lang="en-US" smtClean="0"/>
-              <a:t>1/6/2019</a:t>
+              <a:t>1/7/2019</a:t>
             </a:fld>
             <a:endParaRPr lang="en-US"/>
           </a:p>
@@ -1138,7 +1142,7 @@
           <a:p>
             <a:fld id="{39314CEF-CB52-4A5E-BFDC-3C6F3F58A831}" type="datetimeFigureOut">
               <a:rPr lang="en-US" smtClean="0"/>
-              <a:t>1/6/2019</a:t>
+              <a:t>1/7/2019</a:t>
             </a:fld>
             <a:endParaRPr lang="en-US"/>
           </a:p>
@@ -1384,7 +1388,7 @@
           <a:p>
             <a:fld id="{39314CEF-CB52-4A5E-BFDC-3C6F3F58A831}" type="datetimeFigureOut">
               <a:rPr lang="en-US" smtClean="0"/>
-              <a:t>1/6/2019</a:t>
+              <a:t>1/7/2019</a:t>
             </a:fld>
             <a:endParaRPr lang="en-US"/>
           </a:p>
@@ -1616,7 +1620,7 @@
           <a:p>
             <a:fld id="{39314CEF-CB52-4A5E-BFDC-3C6F3F58A831}" type="datetimeFigureOut">
               <a:rPr lang="en-US" smtClean="0"/>
-              <a:t>1/6/2019</a:t>
+              <a:t>1/7/2019</a:t>
             </a:fld>
             <a:endParaRPr lang="en-US"/>
           </a:p>
@@ -1983,7 +1987,7 @@
           <a:p>
             <a:fld id="{39314CEF-CB52-4A5E-BFDC-3C6F3F58A831}" type="datetimeFigureOut">
               <a:rPr lang="en-US" smtClean="0"/>
-              <a:t>1/6/2019</a:t>
+              <a:t>1/7/2019</a:t>
             </a:fld>
             <a:endParaRPr lang="en-US"/>
           </a:p>
@@ -2101,7 +2105,7 @@
           <a:p>
             <a:fld id="{39314CEF-CB52-4A5E-BFDC-3C6F3F58A831}" type="datetimeFigureOut">
               <a:rPr lang="en-US" smtClean="0"/>
-              <a:t>1/6/2019</a:t>
+              <a:t>1/7/2019</a:t>
             </a:fld>
             <a:endParaRPr lang="en-US"/>
           </a:p>
@@ -2196,7 +2200,7 @@
           <a:p>
             <a:fld id="{39314CEF-CB52-4A5E-BFDC-3C6F3F58A831}" type="datetimeFigureOut">
               <a:rPr lang="en-US" smtClean="0"/>
-              <a:t>1/6/2019</a:t>
+              <a:t>1/7/2019</a:t>
             </a:fld>
             <a:endParaRPr lang="en-US"/>
           </a:p>
@@ -2473,7 +2477,7 @@
           <a:p>
             <a:fld id="{39314CEF-CB52-4A5E-BFDC-3C6F3F58A831}" type="datetimeFigureOut">
               <a:rPr lang="en-US" smtClean="0"/>
-              <a:t>1/6/2019</a:t>
+              <a:t>1/7/2019</a:t>
             </a:fld>
             <a:endParaRPr lang="en-US"/>
           </a:p>
@@ -2730,7 +2734,7 @@
           <a:p>
             <a:fld id="{39314CEF-CB52-4A5E-BFDC-3C6F3F58A831}" type="datetimeFigureOut">
               <a:rPr lang="en-US" smtClean="0"/>
-              <a:t>1/6/2019</a:t>
+              <a:t>1/7/2019</a:t>
             </a:fld>
             <a:endParaRPr lang="en-US"/>
           </a:p>
@@ -2943,7 +2947,7 @@
           <a:p>
             <a:fld id="{39314CEF-CB52-4A5E-BFDC-3C6F3F58A831}" type="datetimeFigureOut">
               <a:rPr lang="en-US" smtClean="0"/>
-              <a:t>1/6/2019</a:t>
+              <a:t>1/7/2019</a:t>
             </a:fld>
             <a:endParaRPr lang="en-US"/>
           </a:p>
@@ -10152,7 +10156,7 @@
         <p:spPr>
           <a:xfrm>
             <a:off x="750094" y="2167447"/>
-            <a:ext cx="9816306" cy="778546"/>
+            <a:ext cx="9816306" cy="3105337"/>
           </a:xfrm>
           <a:prstGeom prst="rect">
             <a:avLst/>
@@ -10222,7 +10226,35 @@
                 <a:latin typeface="Segoe UI Semilight" panose="020B0402040204020203" pitchFamily="34" charset="0"/>
                 <a:cs typeface="Segoe UI Semilight" panose="020B0402040204020203" pitchFamily="34" charset="0"/>
               </a:rPr>
-              <a:t>…</a:t>
+              <a:t> mechanismus, pomocí kterého </a:t>
+            </a:r>
+            <a:r>
+              <a:rPr lang="cs-CZ" sz="3600" dirty="0" err="1">
+                <a:latin typeface="Segoe UI Semilight" panose="020B0402040204020203" pitchFamily="34" charset="0"/>
+                <a:cs typeface="Segoe UI Semilight" panose="020B0402040204020203" pitchFamily="34" charset="0"/>
+              </a:rPr>
+              <a:t>EF</a:t>
+            </a:r>
+            <a:r>
+              <a:rPr lang="cs-CZ" sz="3600" dirty="0">
+                <a:latin typeface="Segoe UI Semilight" panose="020B0402040204020203" pitchFamily="34" charset="0"/>
+                <a:cs typeface="Segoe UI Semilight" panose="020B0402040204020203" pitchFamily="34" charset="0"/>
+              </a:rPr>
+              <a:t> sleduje změny v datech a dokáže tak v případě </a:t>
+            </a:r>
+            <a:r>
+              <a:rPr lang="cs-CZ" sz="3600" dirty="0" err="1">
+                <a:latin typeface="Segoe UI Semilight" panose="020B0402040204020203" pitchFamily="34" charset="0"/>
+                <a:cs typeface="Segoe UI Semilight" panose="020B0402040204020203" pitchFamily="34" charset="0"/>
+              </a:rPr>
+              <a:t>Commitu</a:t>
+            </a:r>
+            <a:r>
+              <a:rPr lang="cs-CZ" sz="3600" dirty="0">
+                <a:latin typeface="Segoe UI Semilight" panose="020B0402040204020203" pitchFamily="34" charset="0"/>
+                <a:cs typeface="Segoe UI Semilight" panose="020B0402040204020203" pitchFamily="34" charset="0"/>
+              </a:rPr>
+              <a:t> transakce provést změny do databáze.</a:t>
             </a:r>
             <a:endParaRPr lang="en-US" sz="3600" dirty="0">
               <a:latin typeface="Segoe UI Semilight" panose="020B0402040204020203" pitchFamily="34" charset="0"/>
@@ -10444,7 +10476,7 @@
         <p:spPr>
           <a:xfrm>
             <a:off x="750094" y="2067238"/>
-            <a:ext cx="11059833" cy="1583960"/>
+            <a:ext cx="11059833" cy="1066895"/>
           </a:xfrm>
           <a:prstGeom prst="rect">
             <a:avLst/>
@@ -10469,7 +10501,7 @@
                 <a:latin typeface="Segoe UI Semilight" panose="020B0402040204020203" pitchFamily="34" charset="0"/>
                 <a:cs typeface="Segoe UI Semilight" panose="020B0402040204020203" pitchFamily="34" charset="0"/>
               </a:rPr>
-              <a:t>Globální nastavení</a:t>
+              <a:t>Standardně zapnutý (globálně)</a:t>
             </a:r>
           </a:p>
           <a:p>
@@ -10485,28 +10517,257 @@
                 <a:latin typeface="Segoe UI Semilight" panose="020B0402040204020203" pitchFamily="34" charset="0"/>
                 <a:cs typeface="Segoe UI Semilight" panose="020B0402040204020203" pitchFamily="34" charset="0"/>
               </a:rPr>
-              <a:t>Nastavení nad množinami dat</a:t>
-            </a:r>
-          </a:p>
-          <a:p>
-            <a:pPr marL="342900" indent="-342900">
-              <a:lnSpc>
-                <a:spcPct val="140000"/>
-              </a:lnSpc>
-              <a:buFontTx/>
-              <a:buChar char="-"/>
-            </a:pPr>
-            <a:r>
-              <a:rPr lang="cs-CZ" sz="2400" dirty="0">
+              <a:t>Probíhá jsou pouze nad entitami, které zná </a:t>
+            </a:r>
+            <a:r>
+              <a:rPr lang="cs-CZ" sz="2400" dirty="0" err="1">
                 <a:latin typeface="Segoe UI Semilight" panose="020B0402040204020203" pitchFamily="34" charset="0"/>
                 <a:cs typeface="Segoe UI Semilight" panose="020B0402040204020203" pitchFamily="34" charset="0"/>
               </a:rPr>
-              <a:t>Využití při odstraňování dat</a:t>
+              <a:t>DbContext</a:t>
             </a:r>
             <a:endParaRPr lang="en-US" sz="2400" dirty="0">
               <a:latin typeface="Segoe UI Semilight" panose="020B0402040204020203" pitchFamily="34" charset="0"/>
               <a:cs typeface="Segoe UI Semilight" panose="020B0402040204020203" pitchFamily="34" charset="0"/>
             </a:endParaRPr>
+          </a:p>
+        </p:txBody>
+      </p:sp>
+      <p:sp>
+        <p:nvSpPr>
+          <p:cNvPr id="2" name="Obdélník 1">
+            <a:extLst>
+              <a:ext uri="{FF2B5EF4-FFF2-40B4-BE49-F238E27FC236}">
+                <a16:creationId xmlns:a16="http://schemas.microsoft.com/office/drawing/2014/main" id="{27C6F051-A93C-4BE1-A234-17F4BFE8D46C}"/>
+              </a:ext>
+            </a:extLst>
+          </p:cNvPr>
+          <p:cNvSpPr/>
+          <p:nvPr/>
+        </p:nvSpPr>
+        <p:spPr>
+          <a:xfrm>
+            <a:off x="1106079" y="3351497"/>
+            <a:ext cx="6096000" cy="3139321"/>
+          </a:xfrm>
+          <a:prstGeom prst="rect">
+            <a:avLst/>
+          </a:prstGeom>
+        </p:spPr>
+        <p:txBody>
+          <a:bodyPr>
+            <a:spAutoFit/>
+          </a:bodyPr>
+          <a:lstStyle/>
+          <a:p>
+            <a:r>
+              <a:rPr lang="cs-CZ" dirty="0" err="1"/>
+              <a:t>using</a:t>
+            </a:r>
+            <a:r>
+              <a:rPr lang="cs-CZ" dirty="0"/>
+              <a:t> (var </a:t>
+            </a:r>
+            <a:r>
+              <a:rPr lang="cs-CZ" dirty="0" err="1"/>
+              <a:t>context</a:t>
+            </a:r>
+            <a:r>
+              <a:rPr lang="cs-CZ" dirty="0"/>
+              <a:t> = </a:t>
+            </a:r>
+            <a:r>
+              <a:rPr lang="cs-CZ" dirty="0" err="1"/>
+              <a:t>new</a:t>
+            </a:r>
+            <a:r>
+              <a:rPr lang="cs-CZ" dirty="0"/>
+              <a:t> </a:t>
+            </a:r>
+            <a:r>
+              <a:rPr lang="cs-CZ" dirty="0" err="1"/>
+              <a:t>BloggingContext</a:t>
+            </a:r>
+            <a:r>
+              <a:rPr lang="cs-CZ" dirty="0"/>
+              <a:t>())</a:t>
+            </a:r>
+          </a:p>
+          <a:p>
+            <a:r>
+              <a:rPr lang="cs-CZ" dirty="0"/>
+              <a:t>{</a:t>
+            </a:r>
+          </a:p>
+          <a:p>
+            <a:r>
+              <a:rPr lang="cs-CZ" dirty="0"/>
+              <a:t>    var blog = </a:t>
+            </a:r>
+            <a:r>
+              <a:rPr lang="cs-CZ" dirty="0" err="1"/>
+              <a:t>context.Blogs</a:t>
+            </a:r>
+            <a:endParaRPr lang="cs-CZ" dirty="0"/>
+          </a:p>
+          <a:p>
+            <a:r>
+              <a:rPr lang="cs-CZ" dirty="0"/>
+              <a:t>        .</a:t>
+            </a:r>
+            <a:r>
+              <a:rPr lang="cs-CZ" dirty="0" err="1"/>
+              <a:t>Select</a:t>
+            </a:r>
+            <a:r>
+              <a:rPr lang="cs-CZ" dirty="0"/>
+              <a:t>(b =&gt;</a:t>
+            </a:r>
+          </a:p>
+          <a:p>
+            <a:r>
+              <a:rPr lang="cs-CZ" dirty="0"/>
+              <a:t>            </a:t>
+            </a:r>
+            <a:r>
+              <a:rPr lang="cs-CZ" dirty="0" err="1"/>
+              <a:t>new</a:t>
+            </a:r>
+            <a:endParaRPr lang="cs-CZ" dirty="0"/>
+          </a:p>
+          <a:p>
+            <a:r>
+              <a:rPr lang="cs-CZ" dirty="0"/>
+              <a:t>            {</a:t>
+            </a:r>
+          </a:p>
+          <a:p>
+            <a:r>
+              <a:rPr lang="cs-CZ" dirty="0"/>
+              <a:t>                </a:t>
+            </a:r>
+            <a:r>
+              <a:rPr lang="cs-CZ" dirty="0">
+                <a:solidFill>
+                  <a:srgbClr val="00ABEC"/>
+                </a:solidFill>
+              </a:rPr>
+              <a:t>Blog</a:t>
+            </a:r>
+            <a:r>
+              <a:rPr lang="cs-CZ" dirty="0"/>
+              <a:t> = b,</a:t>
+            </a:r>
+            <a:br>
+              <a:rPr lang="cs-CZ" dirty="0"/>
+            </a:br>
+            <a:r>
+              <a:rPr lang="cs-CZ" dirty="0"/>
+              <a:t>                Title = </a:t>
+            </a:r>
+            <a:r>
+              <a:rPr lang="cs-CZ" dirty="0" err="1"/>
+              <a:t>b.Title</a:t>
+            </a:r>
+            <a:r>
+              <a:rPr lang="cs-CZ" dirty="0"/>
+              <a:t>,</a:t>
+            </a:r>
+          </a:p>
+          <a:p>
+            <a:r>
+              <a:rPr lang="cs-CZ" dirty="0"/>
+              <a:t>                </a:t>
+            </a:r>
+            <a:r>
+              <a:rPr lang="cs-CZ" dirty="0" err="1"/>
+              <a:t>Posts</a:t>
+            </a:r>
+            <a:r>
+              <a:rPr lang="cs-CZ" dirty="0"/>
+              <a:t> = </a:t>
+            </a:r>
+            <a:r>
+              <a:rPr lang="cs-CZ" dirty="0" err="1"/>
+              <a:t>b.Posts.Count</a:t>
+            </a:r>
+            <a:r>
+              <a:rPr lang="cs-CZ" dirty="0"/>
+              <a:t>()</a:t>
+            </a:r>
+          </a:p>
+          <a:p>
+            <a:r>
+              <a:rPr lang="cs-CZ" dirty="0"/>
+              <a:t>            });</a:t>
+            </a:r>
+          </a:p>
+          <a:p>
+            <a:r>
+              <a:rPr lang="cs-CZ" dirty="0"/>
+              <a:t>}</a:t>
+            </a:r>
+          </a:p>
+        </p:txBody>
+      </p:sp>
+      <p:sp>
+        <p:nvSpPr>
+          <p:cNvPr id="7" name="Obdélník 6">
+            <a:extLst>
+              <a:ext uri="{FF2B5EF4-FFF2-40B4-BE49-F238E27FC236}">
+                <a16:creationId xmlns:a16="http://schemas.microsoft.com/office/drawing/2014/main" id="{BEB24167-4640-4946-8322-AD9690D46E2D}"/>
+              </a:ext>
+            </a:extLst>
+          </p:cNvPr>
+          <p:cNvSpPr/>
+          <p:nvPr/>
+        </p:nvSpPr>
+        <p:spPr>
+          <a:xfrm>
+            <a:off x="9317108" y="438416"/>
+            <a:ext cx="2856038" cy="461665"/>
+          </a:xfrm>
+          <a:prstGeom prst="rect">
+            <a:avLst/>
+          </a:prstGeom>
+        </p:spPr>
+        <p:txBody>
+          <a:bodyPr wrap="none">
+            <a:spAutoFit/>
+          </a:bodyPr>
+          <a:lstStyle/>
+          <a:p>
+            <a:r>
+              <a:rPr lang="cs-CZ" sz="2400" b="1" dirty="0" err="1">
+                <a:solidFill>
+                  <a:srgbClr val="00ABEC"/>
+                </a:solidFill>
+                <a:latin typeface="Segoe UI Semilight" panose="020B0402040204020203" pitchFamily="34" charset="0"/>
+                <a:cs typeface="Segoe UI Semilight" panose="020B0402040204020203" pitchFamily="34" charset="0"/>
+              </a:rPr>
+              <a:t>CHANGE</a:t>
+            </a:r>
+            <a:r>
+              <a:rPr lang="cs-CZ" sz="2400" b="1" dirty="0">
+                <a:solidFill>
+                  <a:srgbClr val="00ABEC"/>
+                </a:solidFill>
+                <a:latin typeface="Segoe UI Semilight" panose="020B0402040204020203" pitchFamily="34" charset="0"/>
+                <a:cs typeface="Segoe UI Semilight" panose="020B0402040204020203" pitchFamily="34" charset="0"/>
+              </a:rPr>
+              <a:t> </a:t>
+            </a:r>
+            <a:r>
+              <a:rPr lang="cs-CZ" sz="2400" b="1" dirty="0" err="1">
+                <a:solidFill>
+                  <a:srgbClr val="00ABEC"/>
+                </a:solidFill>
+                <a:latin typeface="Segoe UI Semilight" panose="020B0402040204020203" pitchFamily="34" charset="0"/>
+                <a:cs typeface="Segoe UI Semilight" panose="020B0402040204020203" pitchFamily="34" charset="0"/>
+              </a:rPr>
+              <a:t>TRACKING</a:t>
+            </a:r>
+            <a:endParaRPr lang="cs-CZ" sz="2400" dirty="0"/>
           </a:p>
         </p:txBody>
       </p:sp>
@@ -10629,6 +10890,2612 @@
               </a:lnSpc>
             </a:pPr>
             <a:r>
+              <a:rPr lang="cs-CZ" sz="5000" b="1" dirty="0" err="1">
+                <a:latin typeface="Segoe UI Light" panose="020B0502040204020203" pitchFamily="34" charset="0"/>
+                <a:cs typeface="Segoe UI Light" panose="020B0502040204020203" pitchFamily="34" charset="0"/>
+              </a:rPr>
+              <a:t>Detect</a:t>
+            </a:r>
+            <a:r>
+              <a:rPr lang="cs-CZ" sz="5000" b="1" dirty="0">
+                <a:latin typeface="Segoe UI Light" panose="020B0502040204020203" pitchFamily="34" charset="0"/>
+                <a:cs typeface="Segoe UI Light" panose="020B0502040204020203" pitchFamily="34" charset="0"/>
+              </a:rPr>
+              <a:t> </a:t>
+            </a:r>
+            <a:r>
+              <a:rPr lang="cs-CZ" sz="5000" b="1" dirty="0" err="1">
+                <a:latin typeface="Segoe UI Light" panose="020B0502040204020203" pitchFamily="34" charset="0"/>
+                <a:cs typeface="Segoe UI Light" panose="020B0502040204020203" pitchFamily="34" charset="0"/>
+              </a:rPr>
+              <a:t>Changes</a:t>
+            </a:r>
+            <a:endParaRPr lang="cs-CZ" sz="5000" b="1" dirty="0">
+              <a:latin typeface="Segoe UI Light" panose="020B0502040204020203" pitchFamily="34" charset="0"/>
+              <a:cs typeface="Segoe UI Light" panose="020B0502040204020203" pitchFamily="34" charset="0"/>
+            </a:endParaRPr>
+          </a:p>
+        </p:txBody>
+      </p:sp>
+      <p:sp>
+        <p:nvSpPr>
+          <p:cNvPr id="28" name="Obdélník 27">
+            <a:extLst>
+              <a:ext uri="{FF2B5EF4-FFF2-40B4-BE49-F238E27FC236}">
+                <a16:creationId xmlns:a16="http://schemas.microsoft.com/office/drawing/2014/main" id="{0D083616-2E7C-C441-9883-F54FD30ED6F3}"/>
+              </a:ext>
+            </a:extLst>
+          </p:cNvPr>
+          <p:cNvSpPr/>
+          <p:nvPr/>
+        </p:nvSpPr>
+        <p:spPr>
+          <a:xfrm>
+            <a:off x="0" y="0"/>
+            <a:ext cx="12214209" cy="308634"/>
+          </a:xfrm>
+          <a:prstGeom prst="rect">
+            <a:avLst/>
+          </a:prstGeom>
+          <a:solidFill>
+            <a:srgbClr val="00ABEC"/>
+          </a:solidFill>
+          <a:ln>
+            <a:noFill/>
+          </a:ln>
+        </p:spPr>
+        <p:style>
+          <a:lnRef idx="2">
+            <a:schemeClr val="accent1">
+              <a:shade val="50000"/>
+            </a:schemeClr>
+          </a:lnRef>
+          <a:fillRef idx="1">
+            <a:schemeClr val="accent1"/>
+          </a:fillRef>
+          <a:effectRef idx="0">
+            <a:schemeClr val="accent1"/>
+          </a:effectRef>
+          <a:fontRef idx="minor">
+            <a:schemeClr val="lt1"/>
+          </a:fontRef>
+        </p:style>
+        <p:txBody>
+          <a:bodyPr rtlCol="0" anchor="ctr"/>
+          <a:lstStyle/>
+          <a:p>
+            <a:pPr algn="ctr"/>
+            <a:endParaRPr lang="cs-CZ"/>
+          </a:p>
+        </p:txBody>
+      </p:sp>
+      <p:sp>
+        <p:nvSpPr>
+          <p:cNvPr id="8" name="TextBox 18">
+            <a:extLst>
+              <a:ext uri="{FF2B5EF4-FFF2-40B4-BE49-F238E27FC236}">
+                <a16:creationId xmlns:a16="http://schemas.microsoft.com/office/drawing/2014/main" id="{DF113CC3-4A88-3B47-BBA8-C063F23D7D57}"/>
+              </a:ext>
+            </a:extLst>
+          </p:cNvPr>
+          <p:cNvSpPr txBox="1"/>
+          <p:nvPr/>
+        </p:nvSpPr>
+        <p:spPr>
+          <a:xfrm>
+            <a:off x="750094" y="2067238"/>
+            <a:ext cx="11059833" cy="2101024"/>
+          </a:xfrm>
+          <a:prstGeom prst="rect">
+            <a:avLst/>
+          </a:prstGeom>
+          <a:noFill/>
+        </p:spPr>
+        <p:txBody>
+          <a:bodyPr wrap="square" rtlCol="0">
+            <a:spAutoFit/>
+          </a:bodyPr>
+          <a:lstStyle/>
+          <a:p>
+            <a:pPr marL="342900" indent="-342900">
+              <a:lnSpc>
+                <a:spcPct val="140000"/>
+              </a:lnSpc>
+              <a:buFontTx/>
+              <a:buChar char="-"/>
+            </a:pPr>
+            <a:r>
+              <a:rPr lang="cs-CZ" sz="2400" dirty="0">
+                <a:latin typeface="Segoe UI Semilight" panose="020B0402040204020203" pitchFamily="34" charset="0"/>
+                <a:cs typeface="Segoe UI Semilight" panose="020B0402040204020203" pitchFamily="34" charset="0"/>
+              </a:rPr>
+              <a:t>Automatická detekce změn v datech</a:t>
+            </a:r>
+          </a:p>
+          <a:p>
+            <a:pPr marL="342900" indent="-342900">
+              <a:lnSpc>
+                <a:spcPct val="140000"/>
+              </a:lnSpc>
+              <a:buFontTx/>
+              <a:buChar char="-"/>
+            </a:pPr>
+            <a:r>
+              <a:rPr lang="cs-CZ" sz="2400" dirty="0">
+                <a:latin typeface="Segoe UI Semilight" panose="020B0402040204020203" pitchFamily="34" charset="0"/>
+                <a:cs typeface="Segoe UI Semilight" panose="020B0402040204020203" pitchFamily="34" charset="0"/>
+              </a:rPr>
+              <a:t>Pro sledování změn v instancích potřebuje </a:t>
+            </a:r>
+            <a:r>
+              <a:rPr lang="cs-CZ" sz="2400" dirty="0" err="1">
+                <a:latin typeface="Segoe UI Semilight" panose="020B0402040204020203" pitchFamily="34" charset="0"/>
+                <a:cs typeface="Segoe UI Semilight" panose="020B0402040204020203" pitchFamily="34" charset="0"/>
+              </a:rPr>
+              <a:t>Change</a:t>
+            </a:r>
+            <a:r>
+              <a:rPr lang="cs-CZ" sz="2400" dirty="0">
+                <a:latin typeface="Segoe UI Semilight" panose="020B0402040204020203" pitchFamily="34" charset="0"/>
+                <a:cs typeface="Segoe UI Semilight" panose="020B0402040204020203" pitchFamily="34" charset="0"/>
+              </a:rPr>
+              <a:t> </a:t>
+            </a:r>
+            <a:r>
+              <a:rPr lang="cs-CZ" sz="2400" dirty="0" err="1">
+                <a:latin typeface="Segoe UI Semilight" panose="020B0402040204020203" pitchFamily="34" charset="0"/>
+                <a:cs typeface="Segoe UI Semilight" panose="020B0402040204020203" pitchFamily="34" charset="0"/>
+              </a:rPr>
+              <a:t>Tracking</a:t>
+            </a:r>
+            <a:endParaRPr lang="cs-CZ" sz="2400" dirty="0">
+              <a:latin typeface="Segoe UI Semilight" panose="020B0402040204020203" pitchFamily="34" charset="0"/>
+              <a:cs typeface="Segoe UI Semilight" panose="020B0402040204020203" pitchFamily="34" charset="0"/>
+            </a:endParaRPr>
+          </a:p>
+          <a:p>
+            <a:pPr marL="342900" indent="-342900">
+              <a:lnSpc>
+                <a:spcPct val="140000"/>
+              </a:lnSpc>
+              <a:buFontTx/>
+              <a:buChar char="-"/>
+            </a:pPr>
+            <a:r>
+              <a:rPr lang="cs-CZ" sz="2400" dirty="0">
+                <a:latin typeface="Segoe UI Semilight" panose="020B0402040204020203" pitchFamily="34" charset="0"/>
+                <a:cs typeface="Segoe UI Semilight" panose="020B0402040204020203" pitchFamily="34" charset="0"/>
+              </a:rPr>
+              <a:t>K aktivaci dochází voláním některých metod</a:t>
+            </a:r>
+          </a:p>
+          <a:p>
+            <a:pPr marL="342900" indent="-342900">
+              <a:lnSpc>
+                <a:spcPct val="140000"/>
+              </a:lnSpc>
+              <a:buFontTx/>
+              <a:buChar char="-"/>
+            </a:pPr>
+            <a:r>
+              <a:rPr lang="cs-CZ" sz="2400" dirty="0">
+                <a:latin typeface="Segoe UI Semilight" panose="020B0402040204020203" pitchFamily="34" charset="0"/>
+                <a:cs typeface="Segoe UI Semilight" panose="020B0402040204020203" pitchFamily="34" charset="0"/>
+              </a:rPr>
+              <a:t>Lze jej vypnout (i dočasně)</a:t>
+            </a:r>
+            <a:endParaRPr lang="en-US" sz="2400" dirty="0">
+              <a:latin typeface="Segoe UI Semilight" panose="020B0402040204020203" pitchFamily="34" charset="0"/>
+              <a:cs typeface="Segoe UI Semilight" panose="020B0402040204020203" pitchFamily="34" charset="0"/>
+            </a:endParaRPr>
+          </a:p>
+        </p:txBody>
+      </p:sp>
+      <p:sp>
+        <p:nvSpPr>
+          <p:cNvPr id="3" name="Obdélník 2">
+            <a:extLst>
+              <a:ext uri="{FF2B5EF4-FFF2-40B4-BE49-F238E27FC236}">
+                <a16:creationId xmlns:a16="http://schemas.microsoft.com/office/drawing/2014/main" id="{8F2CF9DB-79B6-469B-89FD-7BAEF0F6EF2B}"/>
+              </a:ext>
+            </a:extLst>
+          </p:cNvPr>
+          <p:cNvSpPr/>
+          <p:nvPr/>
+        </p:nvSpPr>
+        <p:spPr>
+          <a:xfrm>
+            <a:off x="7031039" y="3233255"/>
+            <a:ext cx="3770179" cy="3139321"/>
+          </a:xfrm>
+          <a:prstGeom prst="rect">
+            <a:avLst/>
+          </a:prstGeom>
+        </p:spPr>
+        <p:txBody>
+          <a:bodyPr wrap="square">
+            <a:spAutoFit/>
+          </a:bodyPr>
+          <a:lstStyle/>
+          <a:p>
+            <a:pPr>
+              <a:buFont typeface="Arial" panose="020B0604020202020204" pitchFamily="34" charset="0"/>
+              <a:buChar char="•"/>
+            </a:pPr>
+            <a:r>
+              <a:rPr lang="cs-CZ" dirty="0" err="1">
+                <a:solidFill>
+                  <a:srgbClr val="000000"/>
+                </a:solidFill>
+                <a:latin typeface="Segoe UI" panose="020B0502040204020203" pitchFamily="34" charset="0"/>
+              </a:rPr>
+              <a:t>DbSet.Find</a:t>
+            </a:r>
+            <a:endParaRPr lang="cs-CZ" dirty="0">
+              <a:solidFill>
+                <a:srgbClr val="000000"/>
+              </a:solidFill>
+              <a:latin typeface="Segoe UI" panose="020B0502040204020203" pitchFamily="34" charset="0"/>
+            </a:endParaRPr>
+          </a:p>
+          <a:p>
+            <a:pPr>
+              <a:buFont typeface="Arial" panose="020B0604020202020204" pitchFamily="34" charset="0"/>
+              <a:buChar char="•"/>
+            </a:pPr>
+            <a:r>
+              <a:rPr lang="cs-CZ" dirty="0" err="1">
+                <a:solidFill>
+                  <a:srgbClr val="000000"/>
+                </a:solidFill>
+                <a:latin typeface="Segoe UI" panose="020B0502040204020203" pitchFamily="34" charset="0"/>
+              </a:rPr>
+              <a:t>DbSet.Local</a:t>
+            </a:r>
+            <a:endParaRPr lang="cs-CZ" dirty="0">
+              <a:solidFill>
+                <a:srgbClr val="000000"/>
+              </a:solidFill>
+              <a:latin typeface="Segoe UI" panose="020B0502040204020203" pitchFamily="34" charset="0"/>
+            </a:endParaRPr>
+          </a:p>
+          <a:p>
+            <a:pPr>
+              <a:buFont typeface="Arial" panose="020B0604020202020204" pitchFamily="34" charset="0"/>
+              <a:buChar char="•"/>
+            </a:pPr>
+            <a:r>
+              <a:rPr lang="cs-CZ" dirty="0" err="1">
+                <a:solidFill>
+                  <a:srgbClr val="000000"/>
+                </a:solidFill>
+                <a:latin typeface="Segoe UI" panose="020B0502040204020203" pitchFamily="34" charset="0"/>
+              </a:rPr>
+              <a:t>DbSet.Add</a:t>
+            </a:r>
+            <a:endParaRPr lang="cs-CZ" dirty="0">
+              <a:solidFill>
+                <a:srgbClr val="000000"/>
+              </a:solidFill>
+              <a:latin typeface="Segoe UI" panose="020B0502040204020203" pitchFamily="34" charset="0"/>
+            </a:endParaRPr>
+          </a:p>
+          <a:p>
+            <a:pPr>
+              <a:buFont typeface="Arial" panose="020B0604020202020204" pitchFamily="34" charset="0"/>
+              <a:buChar char="•"/>
+            </a:pPr>
+            <a:r>
+              <a:rPr lang="cs-CZ" dirty="0" err="1">
+                <a:solidFill>
+                  <a:srgbClr val="000000"/>
+                </a:solidFill>
+                <a:latin typeface="Segoe UI" panose="020B0502040204020203" pitchFamily="34" charset="0"/>
+              </a:rPr>
+              <a:t>DbSet.AddRange</a:t>
+            </a:r>
+            <a:endParaRPr lang="cs-CZ" dirty="0">
+              <a:solidFill>
+                <a:srgbClr val="000000"/>
+              </a:solidFill>
+              <a:latin typeface="Segoe UI" panose="020B0502040204020203" pitchFamily="34" charset="0"/>
+            </a:endParaRPr>
+          </a:p>
+          <a:p>
+            <a:pPr>
+              <a:buFont typeface="Arial" panose="020B0604020202020204" pitchFamily="34" charset="0"/>
+              <a:buChar char="•"/>
+            </a:pPr>
+            <a:r>
+              <a:rPr lang="cs-CZ" dirty="0" err="1">
+                <a:solidFill>
+                  <a:srgbClr val="000000"/>
+                </a:solidFill>
+                <a:latin typeface="Segoe UI" panose="020B0502040204020203" pitchFamily="34" charset="0"/>
+              </a:rPr>
+              <a:t>DbSet.Remove</a:t>
+            </a:r>
+            <a:endParaRPr lang="cs-CZ" dirty="0">
+              <a:solidFill>
+                <a:srgbClr val="000000"/>
+              </a:solidFill>
+              <a:latin typeface="Segoe UI" panose="020B0502040204020203" pitchFamily="34" charset="0"/>
+            </a:endParaRPr>
+          </a:p>
+          <a:p>
+            <a:pPr>
+              <a:buFont typeface="Arial" panose="020B0604020202020204" pitchFamily="34" charset="0"/>
+              <a:buChar char="•"/>
+            </a:pPr>
+            <a:r>
+              <a:rPr lang="cs-CZ" dirty="0" err="1">
+                <a:solidFill>
+                  <a:srgbClr val="000000"/>
+                </a:solidFill>
+                <a:latin typeface="Segoe UI" panose="020B0502040204020203" pitchFamily="34" charset="0"/>
+              </a:rPr>
+              <a:t>DbSet.RemoveRange</a:t>
+            </a:r>
+            <a:endParaRPr lang="cs-CZ" dirty="0">
+              <a:solidFill>
+                <a:srgbClr val="000000"/>
+              </a:solidFill>
+              <a:latin typeface="Segoe UI" panose="020B0502040204020203" pitchFamily="34" charset="0"/>
+            </a:endParaRPr>
+          </a:p>
+          <a:p>
+            <a:pPr>
+              <a:buFont typeface="Arial" panose="020B0604020202020204" pitchFamily="34" charset="0"/>
+              <a:buChar char="•"/>
+            </a:pPr>
+            <a:r>
+              <a:rPr lang="cs-CZ" dirty="0" err="1">
+                <a:solidFill>
+                  <a:srgbClr val="000000"/>
+                </a:solidFill>
+                <a:latin typeface="Segoe UI" panose="020B0502040204020203" pitchFamily="34" charset="0"/>
+              </a:rPr>
+              <a:t>DbSet.Attach</a:t>
+            </a:r>
+            <a:endParaRPr lang="cs-CZ" dirty="0">
+              <a:solidFill>
+                <a:srgbClr val="000000"/>
+              </a:solidFill>
+              <a:latin typeface="Segoe UI" panose="020B0502040204020203" pitchFamily="34" charset="0"/>
+            </a:endParaRPr>
+          </a:p>
+          <a:p>
+            <a:pPr>
+              <a:buFont typeface="Arial" panose="020B0604020202020204" pitchFamily="34" charset="0"/>
+              <a:buChar char="•"/>
+            </a:pPr>
+            <a:r>
+              <a:rPr lang="cs-CZ" dirty="0" err="1">
+                <a:solidFill>
+                  <a:srgbClr val="000000"/>
+                </a:solidFill>
+                <a:latin typeface="Segoe UI" panose="020B0502040204020203" pitchFamily="34" charset="0"/>
+              </a:rPr>
+              <a:t>DbContext.SaveChanges</a:t>
+            </a:r>
+            <a:endParaRPr lang="cs-CZ" dirty="0">
+              <a:solidFill>
+                <a:srgbClr val="000000"/>
+              </a:solidFill>
+              <a:latin typeface="Segoe UI" panose="020B0502040204020203" pitchFamily="34" charset="0"/>
+            </a:endParaRPr>
+          </a:p>
+          <a:p>
+            <a:pPr>
+              <a:buFont typeface="Arial" panose="020B0604020202020204" pitchFamily="34" charset="0"/>
+              <a:buChar char="•"/>
+            </a:pPr>
+            <a:r>
+              <a:rPr lang="cs-CZ" dirty="0" err="1">
+                <a:solidFill>
+                  <a:srgbClr val="000000"/>
+                </a:solidFill>
+                <a:latin typeface="Segoe UI" panose="020B0502040204020203" pitchFamily="34" charset="0"/>
+              </a:rPr>
+              <a:t>DbContext.GetValidationErrors</a:t>
+            </a:r>
+            <a:endParaRPr lang="cs-CZ" dirty="0">
+              <a:solidFill>
+                <a:srgbClr val="000000"/>
+              </a:solidFill>
+              <a:latin typeface="Segoe UI" panose="020B0502040204020203" pitchFamily="34" charset="0"/>
+            </a:endParaRPr>
+          </a:p>
+          <a:p>
+            <a:pPr>
+              <a:buFont typeface="Arial" panose="020B0604020202020204" pitchFamily="34" charset="0"/>
+              <a:buChar char="•"/>
+            </a:pPr>
+            <a:r>
+              <a:rPr lang="cs-CZ" dirty="0" err="1">
+                <a:solidFill>
+                  <a:srgbClr val="000000"/>
+                </a:solidFill>
+                <a:latin typeface="Segoe UI" panose="020B0502040204020203" pitchFamily="34" charset="0"/>
+              </a:rPr>
+              <a:t>DbContext.Entry</a:t>
+            </a:r>
+            <a:endParaRPr lang="cs-CZ" dirty="0">
+              <a:solidFill>
+                <a:srgbClr val="000000"/>
+              </a:solidFill>
+              <a:latin typeface="Segoe UI" panose="020B0502040204020203" pitchFamily="34" charset="0"/>
+            </a:endParaRPr>
+          </a:p>
+          <a:p>
+            <a:pPr>
+              <a:buFont typeface="Arial" panose="020B0604020202020204" pitchFamily="34" charset="0"/>
+              <a:buChar char="•"/>
+            </a:pPr>
+            <a:r>
+              <a:rPr lang="cs-CZ" dirty="0" err="1">
+                <a:solidFill>
+                  <a:srgbClr val="000000"/>
+                </a:solidFill>
+                <a:latin typeface="Segoe UI" panose="020B0502040204020203" pitchFamily="34" charset="0"/>
+              </a:rPr>
+              <a:t>DbChangeTracker.Entries</a:t>
+            </a:r>
+            <a:endParaRPr lang="cs-CZ" b="0" i="0" dirty="0">
+              <a:solidFill>
+                <a:srgbClr val="000000"/>
+              </a:solidFill>
+              <a:effectLst/>
+              <a:latin typeface="Segoe UI" panose="020B0502040204020203" pitchFamily="34" charset="0"/>
+            </a:endParaRPr>
+          </a:p>
+        </p:txBody>
+      </p:sp>
+      <p:sp>
+        <p:nvSpPr>
+          <p:cNvPr id="9" name="Obdélník 8">
+            <a:extLst>
+              <a:ext uri="{FF2B5EF4-FFF2-40B4-BE49-F238E27FC236}">
+                <a16:creationId xmlns:a16="http://schemas.microsoft.com/office/drawing/2014/main" id="{2B9DBF20-385D-4CFE-8417-2FA1BB959BD6}"/>
+              </a:ext>
+            </a:extLst>
+          </p:cNvPr>
+          <p:cNvSpPr/>
+          <p:nvPr/>
+        </p:nvSpPr>
+        <p:spPr>
+          <a:xfrm>
+            <a:off x="9317108" y="438416"/>
+            <a:ext cx="2856038" cy="461665"/>
+          </a:xfrm>
+          <a:prstGeom prst="rect">
+            <a:avLst/>
+          </a:prstGeom>
+        </p:spPr>
+        <p:txBody>
+          <a:bodyPr wrap="none">
+            <a:spAutoFit/>
+          </a:bodyPr>
+          <a:lstStyle/>
+          <a:p>
+            <a:r>
+              <a:rPr lang="cs-CZ" sz="2400" b="1" dirty="0" err="1">
+                <a:solidFill>
+                  <a:srgbClr val="00ABEC"/>
+                </a:solidFill>
+                <a:latin typeface="Segoe UI Semilight" panose="020B0402040204020203" pitchFamily="34" charset="0"/>
+                <a:cs typeface="Segoe UI Semilight" panose="020B0402040204020203" pitchFamily="34" charset="0"/>
+              </a:rPr>
+              <a:t>CHANGE</a:t>
+            </a:r>
+            <a:r>
+              <a:rPr lang="cs-CZ" sz="2400" b="1" dirty="0">
+                <a:solidFill>
+                  <a:srgbClr val="00ABEC"/>
+                </a:solidFill>
+                <a:latin typeface="Segoe UI Semilight" panose="020B0402040204020203" pitchFamily="34" charset="0"/>
+                <a:cs typeface="Segoe UI Semilight" panose="020B0402040204020203" pitchFamily="34" charset="0"/>
+              </a:rPr>
+              <a:t> </a:t>
+            </a:r>
+            <a:r>
+              <a:rPr lang="cs-CZ" sz="2400" b="1" dirty="0" err="1">
+                <a:solidFill>
+                  <a:srgbClr val="00ABEC"/>
+                </a:solidFill>
+                <a:latin typeface="Segoe UI Semilight" panose="020B0402040204020203" pitchFamily="34" charset="0"/>
+                <a:cs typeface="Segoe UI Semilight" panose="020B0402040204020203" pitchFamily="34" charset="0"/>
+              </a:rPr>
+              <a:t>TRACKING</a:t>
+            </a:r>
+            <a:endParaRPr lang="cs-CZ" sz="2400" dirty="0"/>
+          </a:p>
+        </p:txBody>
+      </p:sp>
+    </p:spTree>
+    <p:extLst>
+      <p:ext uri="{BB962C8B-B14F-4D97-AF65-F5344CB8AC3E}">
+        <p14:creationId xmlns:p14="http://schemas.microsoft.com/office/powerpoint/2010/main" val="2200564722"/>
+      </p:ext>
+    </p:extLst>
+  </p:cSld>
+  <p:clrMapOvr>
+    <a:masterClrMapping/>
+  </p:clrMapOvr>
+  <mc:AlternateContent xmlns:mc="http://schemas.openxmlformats.org/markup-compatibility/2006" xmlns:p14="http://schemas.microsoft.com/office/powerpoint/2010/main">
+    <mc:Choice Requires="p14">
+      <p:transition spd="slow" p14:dur="1300">
+        <p14:pan dir="u"/>
+      </p:transition>
+    </mc:Choice>
+    <mc:Fallback xmlns="">
+      <p:transition spd="slow">
+        <p:fade/>
+      </p:transition>
+    </mc:Fallback>
+  </mc:AlternateContent>
+</p:sld>
+</file>
+
+<file path=ppt/slides/slide23.xml><?xml version="1.0" encoding="utf-8"?>
+<p:sld xmlns:a="http://schemas.openxmlformats.org/drawingml/2006/main" xmlns:r="http://schemas.openxmlformats.org/officeDocument/2006/relationships" xmlns:p="http://schemas.openxmlformats.org/presentationml/2006/main">
+  <p:cSld>
+    <p:bg>
+      <p:bgPr>
+        <a:solidFill>
+          <a:schemeClr val="bg1"/>
+        </a:solidFill>
+        <a:effectLst/>
+      </p:bgPr>
+    </p:bg>
+    <p:spTree>
+      <p:nvGrpSpPr>
+        <p:cNvPr id="1" name=""/>
+        <p:cNvGrpSpPr/>
+        <p:nvPr/>
+      </p:nvGrpSpPr>
+      <p:grpSpPr>
+        <a:xfrm>
+          <a:off x="0" y="0"/>
+          <a:ext cx="0" cy="0"/>
+          <a:chOff x="0" y="0"/>
+          <a:chExt cx="0" cy="0"/>
+        </a:xfrm>
+      </p:grpSpPr>
+      <p:pic>
+        <p:nvPicPr>
+          <p:cNvPr id="18" name="Picture 8" descr="http://emanuelscirlet.com/uploads/powered/stdntpartner.bmp"/>
+          <p:cNvPicPr>
+            <a:picLocks noChangeAspect="1" noChangeArrowheads="1"/>
+          </p:cNvPicPr>
+          <p:nvPr/>
+        </p:nvPicPr>
+        <p:blipFill>
+          <a:blip r:embed="rId2" cstate="print">
+            <a:extLst>
+              <a:ext uri="{28A0092B-C50C-407E-A947-70E740481C1C}">
+                <a14:useLocalDpi xmlns:a14="http://schemas.microsoft.com/office/drawing/2010/main" val="0"/>
+              </a:ext>
+            </a:extLst>
+          </a:blip>
+          <a:srcRect/>
+          <a:stretch>
+            <a:fillRect/>
+          </a:stretch>
+        </p:blipFill>
+        <p:spPr bwMode="auto">
+          <a:xfrm>
+            <a:off x="8388969" y="12294552"/>
+            <a:ext cx="1073175" cy="200326"/>
+          </a:xfrm>
+          <a:prstGeom prst="rect">
+            <a:avLst/>
+          </a:prstGeom>
+          <a:noFill/>
+          <a:extLst>
+            <a:ext uri="{909E8E84-426E-40DD-AFC4-6F175D3DCCD1}">
+              <a14:hiddenFill xmlns:a14="http://schemas.microsoft.com/office/drawing/2010/main">
+                <a:solidFill>
+                  <a:srgbClr val="FFFFFF"/>
+                </a:solidFill>
+              </a14:hiddenFill>
+            </a:ext>
+          </a:extLst>
+        </p:spPr>
+      </p:pic>
+      <p:sp>
+        <p:nvSpPr>
+          <p:cNvPr id="21" name="TextBox 20"/>
+          <p:cNvSpPr txBox="1"/>
+          <p:nvPr/>
+        </p:nvSpPr>
+        <p:spPr>
+          <a:xfrm>
+            <a:off x="660363" y="694083"/>
+            <a:ext cx="8886446" cy="987706"/>
+          </a:xfrm>
+          <a:prstGeom prst="rect">
+            <a:avLst/>
+          </a:prstGeom>
+          <a:noFill/>
+        </p:spPr>
+        <p:txBody>
+          <a:bodyPr wrap="square" rtlCol="0">
+            <a:spAutoFit/>
+          </a:bodyPr>
+          <a:lstStyle/>
+          <a:p>
+            <a:pPr>
+              <a:lnSpc>
+                <a:spcPct val="130000"/>
+              </a:lnSpc>
+            </a:pPr>
+            <a:r>
+              <a:rPr lang="cs-CZ" sz="5000" b="1" dirty="0">
+                <a:latin typeface="Segoe UI Light" panose="020B0502040204020203" pitchFamily="34" charset="0"/>
+                <a:cs typeface="Segoe UI Light" panose="020B0502040204020203" pitchFamily="34" charset="0"/>
+              </a:rPr>
+              <a:t>Příklad 1</a:t>
+            </a:r>
+          </a:p>
+        </p:txBody>
+      </p:sp>
+      <p:sp>
+        <p:nvSpPr>
+          <p:cNvPr id="28" name="Obdélník 27">
+            <a:extLst>
+              <a:ext uri="{FF2B5EF4-FFF2-40B4-BE49-F238E27FC236}">
+                <a16:creationId xmlns:a16="http://schemas.microsoft.com/office/drawing/2014/main" id="{0D083616-2E7C-C441-9883-F54FD30ED6F3}"/>
+              </a:ext>
+            </a:extLst>
+          </p:cNvPr>
+          <p:cNvSpPr/>
+          <p:nvPr/>
+        </p:nvSpPr>
+        <p:spPr>
+          <a:xfrm>
+            <a:off x="0" y="0"/>
+            <a:ext cx="12214209" cy="308634"/>
+          </a:xfrm>
+          <a:prstGeom prst="rect">
+            <a:avLst/>
+          </a:prstGeom>
+          <a:solidFill>
+            <a:srgbClr val="00ABEC"/>
+          </a:solidFill>
+          <a:ln>
+            <a:noFill/>
+          </a:ln>
+        </p:spPr>
+        <p:style>
+          <a:lnRef idx="2">
+            <a:schemeClr val="accent1">
+              <a:shade val="50000"/>
+            </a:schemeClr>
+          </a:lnRef>
+          <a:fillRef idx="1">
+            <a:schemeClr val="accent1"/>
+          </a:fillRef>
+          <a:effectRef idx="0">
+            <a:schemeClr val="accent1"/>
+          </a:effectRef>
+          <a:fontRef idx="minor">
+            <a:schemeClr val="lt1"/>
+          </a:fontRef>
+        </p:style>
+        <p:txBody>
+          <a:bodyPr rtlCol="0" anchor="ctr"/>
+          <a:lstStyle/>
+          <a:p>
+            <a:pPr algn="ctr"/>
+            <a:endParaRPr lang="cs-CZ"/>
+          </a:p>
+        </p:txBody>
+      </p:sp>
+      <p:sp>
+        <p:nvSpPr>
+          <p:cNvPr id="9" name="Obdélník 8">
+            <a:extLst>
+              <a:ext uri="{FF2B5EF4-FFF2-40B4-BE49-F238E27FC236}">
+                <a16:creationId xmlns:a16="http://schemas.microsoft.com/office/drawing/2014/main" id="{2B9DBF20-385D-4CFE-8417-2FA1BB959BD6}"/>
+              </a:ext>
+            </a:extLst>
+          </p:cNvPr>
+          <p:cNvSpPr/>
+          <p:nvPr/>
+        </p:nvSpPr>
+        <p:spPr>
+          <a:xfrm>
+            <a:off x="9317108" y="438416"/>
+            <a:ext cx="2856038" cy="461665"/>
+          </a:xfrm>
+          <a:prstGeom prst="rect">
+            <a:avLst/>
+          </a:prstGeom>
+        </p:spPr>
+        <p:txBody>
+          <a:bodyPr wrap="none">
+            <a:spAutoFit/>
+          </a:bodyPr>
+          <a:lstStyle/>
+          <a:p>
+            <a:r>
+              <a:rPr lang="cs-CZ" sz="2400" b="1" dirty="0" err="1">
+                <a:solidFill>
+                  <a:srgbClr val="00ABEC"/>
+                </a:solidFill>
+                <a:latin typeface="Segoe UI Semilight" panose="020B0402040204020203" pitchFamily="34" charset="0"/>
+                <a:cs typeface="Segoe UI Semilight" panose="020B0402040204020203" pitchFamily="34" charset="0"/>
+              </a:rPr>
+              <a:t>CHANGE</a:t>
+            </a:r>
+            <a:r>
+              <a:rPr lang="cs-CZ" sz="2400" b="1" dirty="0">
+                <a:solidFill>
+                  <a:srgbClr val="00ABEC"/>
+                </a:solidFill>
+                <a:latin typeface="Segoe UI Semilight" panose="020B0402040204020203" pitchFamily="34" charset="0"/>
+                <a:cs typeface="Segoe UI Semilight" panose="020B0402040204020203" pitchFamily="34" charset="0"/>
+              </a:rPr>
+              <a:t> </a:t>
+            </a:r>
+            <a:r>
+              <a:rPr lang="cs-CZ" sz="2400" b="1" dirty="0" err="1">
+                <a:solidFill>
+                  <a:srgbClr val="00ABEC"/>
+                </a:solidFill>
+                <a:latin typeface="Segoe UI Semilight" panose="020B0402040204020203" pitchFamily="34" charset="0"/>
+                <a:cs typeface="Segoe UI Semilight" panose="020B0402040204020203" pitchFamily="34" charset="0"/>
+              </a:rPr>
+              <a:t>TRACKING</a:t>
+            </a:r>
+            <a:endParaRPr lang="cs-CZ" sz="2400" dirty="0"/>
+          </a:p>
+        </p:txBody>
+      </p:sp>
+      <p:sp>
+        <p:nvSpPr>
+          <p:cNvPr id="4" name="Obdélník 3">
+            <a:extLst>
+              <a:ext uri="{FF2B5EF4-FFF2-40B4-BE49-F238E27FC236}">
+                <a16:creationId xmlns:a16="http://schemas.microsoft.com/office/drawing/2014/main" id="{EC240F4E-51A2-420C-AB8C-F8CEC44960DC}"/>
+              </a:ext>
+            </a:extLst>
+          </p:cNvPr>
+          <p:cNvSpPr/>
+          <p:nvPr/>
+        </p:nvSpPr>
+        <p:spPr>
+          <a:xfrm>
+            <a:off x="729007" y="1848475"/>
+            <a:ext cx="6096000" cy="4801314"/>
+          </a:xfrm>
+          <a:prstGeom prst="rect">
+            <a:avLst/>
+          </a:prstGeom>
+        </p:spPr>
+        <p:txBody>
+          <a:bodyPr>
+            <a:spAutoFit/>
+          </a:bodyPr>
+          <a:lstStyle/>
+          <a:p>
+            <a:r>
+              <a:rPr lang="cs-CZ" dirty="0" err="1"/>
+              <a:t>using</a:t>
+            </a:r>
+            <a:r>
+              <a:rPr lang="cs-CZ" dirty="0"/>
+              <a:t> (var </a:t>
+            </a:r>
+            <a:r>
+              <a:rPr lang="cs-CZ" dirty="0" err="1"/>
+              <a:t>context</a:t>
+            </a:r>
+            <a:r>
+              <a:rPr lang="cs-CZ" dirty="0"/>
+              <a:t> = </a:t>
+            </a:r>
+            <a:r>
+              <a:rPr lang="cs-CZ" dirty="0" err="1"/>
+              <a:t>new</a:t>
+            </a:r>
+            <a:r>
+              <a:rPr lang="cs-CZ" dirty="0"/>
+              <a:t> </a:t>
+            </a:r>
+            <a:r>
+              <a:rPr lang="cs-CZ" dirty="0" err="1"/>
+              <a:t>BloggingContext</a:t>
+            </a:r>
+            <a:r>
+              <a:rPr lang="cs-CZ" dirty="0"/>
+              <a:t>())</a:t>
+            </a:r>
+          </a:p>
+          <a:p>
+            <a:r>
+              <a:rPr lang="cs-CZ" dirty="0"/>
+              <a:t>{</a:t>
+            </a:r>
+          </a:p>
+          <a:p>
+            <a:r>
+              <a:rPr lang="cs-CZ" dirty="0"/>
+              <a:t>    </a:t>
+            </a:r>
+            <a:r>
+              <a:rPr lang="cs-CZ" dirty="0" err="1"/>
+              <a:t>try</a:t>
+            </a:r>
+            <a:endParaRPr lang="cs-CZ" dirty="0"/>
+          </a:p>
+          <a:p>
+            <a:r>
+              <a:rPr lang="cs-CZ" dirty="0"/>
+              <a:t>    {</a:t>
+            </a:r>
+          </a:p>
+          <a:p>
+            <a:endParaRPr lang="cs-CZ" dirty="0"/>
+          </a:p>
+          <a:p>
+            <a:endParaRPr lang="cs-CZ" dirty="0"/>
+          </a:p>
+          <a:p>
+            <a:r>
+              <a:rPr lang="cs-CZ" dirty="0"/>
+              <a:t>        // Make many </a:t>
+            </a:r>
+            <a:r>
+              <a:rPr lang="cs-CZ" dirty="0" err="1"/>
+              <a:t>calls</a:t>
+            </a:r>
+            <a:r>
+              <a:rPr lang="cs-CZ" dirty="0"/>
+              <a:t> in a </a:t>
+            </a:r>
+            <a:r>
+              <a:rPr lang="cs-CZ" dirty="0" err="1"/>
+              <a:t>loop</a:t>
+            </a:r>
+            <a:endParaRPr lang="cs-CZ" dirty="0"/>
+          </a:p>
+          <a:p>
+            <a:r>
+              <a:rPr lang="cs-CZ" dirty="0"/>
+              <a:t>        </a:t>
+            </a:r>
+            <a:r>
+              <a:rPr lang="cs-CZ" dirty="0" err="1"/>
+              <a:t>foreach</a:t>
+            </a:r>
+            <a:r>
+              <a:rPr lang="cs-CZ" dirty="0"/>
+              <a:t> (var blog in </a:t>
+            </a:r>
+            <a:r>
+              <a:rPr lang="cs-CZ" dirty="0" err="1"/>
+              <a:t>aLotOfBlogs</a:t>
+            </a:r>
+            <a:r>
+              <a:rPr lang="cs-CZ" dirty="0"/>
+              <a:t>)</a:t>
+            </a:r>
+          </a:p>
+          <a:p>
+            <a:r>
+              <a:rPr lang="cs-CZ" dirty="0"/>
+              <a:t>        {</a:t>
+            </a:r>
+          </a:p>
+          <a:p>
+            <a:r>
+              <a:rPr lang="cs-CZ" dirty="0"/>
+              <a:t>            </a:t>
+            </a:r>
+            <a:r>
+              <a:rPr lang="cs-CZ" dirty="0" err="1"/>
+              <a:t>context.Blogs.Add</a:t>
+            </a:r>
+            <a:r>
+              <a:rPr lang="cs-CZ" dirty="0"/>
+              <a:t>(blog);</a:t>
+            </a:r>
+          </a:p>
+          <a:p>
+            <a:r>
+              <a:rPr lang="cs-CZ" dirty="0"/>
+              <a:t>        }</a:t>
+            </a:r>
+          </a:p>
+          <a:p>
+            <a:r>
+              <a:rPr lang="cs-CZ" dirty="0"/>
+              <a:t>    }</a:t>
+            </a:r>
+          </a:p>
+          <a:p>
+            <a:r>
+              <a:rPr lang="cs-CZ" dirty="0"/>
+              <a:t>    </a:t>
+            </a:r>
+            <a:r>
+              <a:rPr lang="cs-CZ" dirty="0" err="1"/>
+              <a:t>finally</a:t>
+            </a:r>
+            <a:endParaRPr lang="cs-CZ" dirty="0"/>
+          </a:p>
+          <a:p>
+            <a:r>
+              <a:rPr lang="cs-CZ" dirty="0"/>
+              <a:t>    {</a:t>
+            </a:r>
+          </a:p>
+          <a:p>
+            <a:r>
+              <a:rPr lang="cs-CZ" dirty="0"/>
+              <a:t> </a:t>
+            </a:r>
+          </a:p>
+          <a:p>
+            <a:r>
+              <a:rPr lang="cs-CZ" dirty="0"/>
+              <a:t>    }</a:t>
+            </a:r>
+          </a:p>
+          <a:p>
+            <a:r>
+              <a:rPr lang="cs-CZ" dirty="0"/>
+              <a:t>}</a:t>
+            </a:r>
+          </a:p>
+        </p:txBody>
+      </p:sp>
+      <p:sp>
+        <p:nvSpPr>
+          <p:cNvPr id="10" name="Obdélník 9">
+            <a:extLst>
+              <a:ext uri="{FF2B5EF4-FFF2-40B4-BE49-F238E27FC236}">
+                <a16:creationId xmlns:a16="http://schemas.microsoft.com/office/drawing/2014/main" id="{45E4D623-A28C-431B-8F8B-4B49943471A2}"/>
+              </a:ext>
+            </a:extLst>
+          </p:cNvPr>
+          <p:cNvSpPr/>
+          <p:nvPr/>
+        </p:nvSpPr>
+        <p:spPr>
+          <a:xfrm>
+            <a:off x="1154727" y="1848475"/>
+            <a:ext cx="6096000" cy="4247317"/>
+          </a:xfrm>
+          <a:prstGeom prst="rect">
+            <a:avLst/>
+          </a:prstGeom>
+        </p:spPr>
+        <p:txBody>
+          <a:bodyPr>
+            <a:spAutoFit/>
+          </a:bodyPr>
+          <a:lstStyle/>
+          <a:p>
+            <a:endParaRPr lang="cs-CZ" dirty="0">
+              <a:solidFill>
+                <a:srgbClr val="FF0000"/>
+              </a:solidFill>
+            </a:endParaRPr>
+          </a:p>
+          <a:p>
+            <a:endParaRPr lang="cs-CZ" dirty="0">
+              <a:solidFill>
+                <a:srgbClr val="FF0000"/>
+              </a:solidFill>
+            </a:endParaRPr>
+          </a:p>
+          <a:p>
+            <a:endParaRPr lang="cs-CZ" dirty="0">
+              <a:solidFill>
+                <a:srgbClr val="FF0000"/>
+              </a:solidFill>
+            </a:endParaRPr>
+          </a:p>
+          <a:p>
+            <a:endParaRPr lang="cs-CZ" dirty="0">
+              <a:solidFill>
+                <a:srgbClr val="FF0000"/>
+              </a:solidFill>
+            </a:endParaRPr>
+          </a:p>
+          <a:p>
+            <a:r>
+              <a:rPr lang="cs-CZ" dirty="0" err="1">
+                <a:solidFill>
+                  <a:srgbClr val="FF0000"/>
+                </a:solidFill>
+              </a:rPr>
+              <a:t>context.Configuration.</a:t>
+            </a:r>
+            <a:r>
+              <a:rPr lang="cs-CZ" b="1" dirty="0" err="1">
+                <a:solidFill>
+                  <a:srgbClr val="FF0000"/>
+                </a:solidFill>
+              </a:rPr>
+              <a:t>AutoDetectChangesEnabled</a:t>
+            </a:r>
+            <a:r>
+              <a:rPr lang="cs-CZ" dirty="0">
+                <a:solidFill>
+                  <a:srgbClr val="FF0000"/>
+                </a:solidFill>
+              </a:rPr>
+              <a:t> = </a:t>
+            </a:r>
+            <a:r>
+              <a:rPr lang="cs-CZ" dirty="0" err="1">
+                <a:solidFill>
+                  <a:srgbClr val="FF0000"/>
+                </a:solidFill>
+              </a:rPr>
+              <a:t>false</a:t>
+            </a:r>
+            <a:r>
+              <a:rPr lang="cs-CZ" dirty="0">
+                <a:solidFill>
+                  <a:srgbClr val="FF0000"/>
+                </a:solidFill>
+              </a:rPr>
+              <a:t>;</a:t>
+            </a:r>
+          </a:p>
+          <a:p>
+            <a:endParaRPr lang="cs-CZ" dirty="0">
+              <a:solidFill>
+                <a:srgbClr val="FF0000"/>
+              </a:solidFill>
+            </a:endParaRPr>
+          </a:p>
+          <a:p>
+            <a:endParaRPr lang="cs-CZ" dirty="0">
+              <a:solidFill>
+                <a:srgbClr val="FF0000"/>
+              </a:solidFill>
+            </a:endParaRPr>
+          </a:p>
+          <a:p>
+            <a:endParaRPr lang="cs-CZ" dirty="0">
+              <a:solidFill>
+                <a:srgbClr val="FF0000"/>
+              </a:solidFill>
+            </a:endParaRPr>
+          </a:p>
+          <a:p>
+            <a:endParaRPr lang="cs-CZ" dirty="0">
+              <a:solidFill>
+                <a:srgbClr val="FF0000"/>
+              </a:solidFill>
+            </a:endParaRPr>
+          </a:p>
+          <a:p>
+            <a:endParaRPr lang="cs-CZ" dirty="0">
+              <a:solidFill>
+                <a:srgbClr val="FF0000"/>
+              </a:solidFill>
+            </a:endParaRPr>
+          </a:p>
+          <a:p>
+            <a:endParaRPr lang="cs-CZ" dirty="0">
+              <a:solidFill>
+                <a:srgbClr val="FF0000"/>
+              </a:solidFill>
+            </a:endParaRPr>
+          </a:p>
+          <a:p>
+            <a:endParaRPr lang="cs-CZ" dirty="0">
+              <a:solidFill>
+                <a:srgbClr val="FF0000"/>
+              </a:solidFill>
+            </a:endParaRPr>
+          </a:p>
+          <a:p>
+            <a:endParaRPr lang="cs-CZ" dirty="0">
+              <a:solidFill>
+                <a:srgbClr val="FF0000"/>
+              </a:solidFill>
+            </a:endParaRPr>
+          </a:p>
+          <a:p>
+            <a:endParaRPr lang="cs-CZ" dirty="0">
+              <a:solidFill>
+                <a:srgbClr val="FF0000"/>
+              </a:solidFill>
+            </a:endParaRPr>
+          </a:p>
+          <a:p>
+            <a:r>
+              <a:rPr lang="cs-CZ" dirty="0" err="1">
+                <a:solidFill>
+                  <a:srgbClr val="FF0000"/>
+                </a:solidFill>
+              </a:rPr>
+              <a:t>context.Configuration.</a:t>
+            </a:r>
+            <a:r>
+              <a:rPr lang="cs-CZ" b="1" dirty="0" err="1">
+                <a:solidFill>
+                  <a:srgbClr val="FF0000"/>
+                </a:solidFill>
+              </a:rPr>
+              <a:t>AutoDetectChangesEnabled</a:t>
+            </a:r>
+            <a:r>
+              <a:rPr lang="cs-CZ" dirty="0">
+                <a:solidFill>
+                  <a:srgbClr val="FF0000"/>
+                </a:solidFill>
+              </a:rPr>
+              <a:t> = </a:t>
+            </a:r>
+            <a:r>
+              <a:rPr lang="cs-CZ" dirty="0" err="1">
+                <a:solidFill>
+                  <a:srgbClr val="FF0000"/>
+                </a:solidFill>
+              </a:rPr>
+              <a:t>true</a:t>
+            </a:r>
+            <a:r>
+              <a:rPr lang="cs-CZ" dirty="0">
+                <a:solidFill>
+                  <a:srgbClr val="FF0000"/>
+                </a:solidFill>
+              </a:rPr>
+              <a:t>;</a:t>
+            </a:r>
+          </a:p>
+        </p:txBody>
+      </p:sp>
+    </p:spTree>
+    <p:extLst>
+      <p:ext uri="{BB962C8B-B14F-4D97-AF65-F5344CB8AC3E}">
+        <p14:creationId xmlns:p14="http://schemas.microsoft.com/office/powerpoint/2010/main" val="3978035793"/>
+      </p:ext>
+    </p:extLst>
+  </p:cSld>
+  <p:clrMapOvr>
+    <a:masterClrMapping/>
+  </p:clrMapOvr>
+  <mc:AlternateContent xmlns:mc="http://schemas.openxmlformats.org/markup-compatibility/2006" xmlns:p14="http://schemas.microsoft.com/office/powerpoint/2010/main">
+    <mc:Choice Requires="p14">
+      <p:transition spd="slow" p14:dur="1300">
+        <p14:pan dir="u"/>
+      </p:transition>
+    </mc:Choice>
+    <mc:Fallback xmlns="">
+      <p:transition spd="slow">
+        <p:fade/>
+      </p:transition>
+    </mc:Fallback>
+  </mc:AlternateContent>
+  <p:timing>
+    <p:tnLst>
+      <p:par>
+        <p:cTn id="1" dur="indefinite" restart="never" nodeType="tmRoot">
+          <p:childTnLst>
+            <p:seq concurrent="1" nextAc="seek">
+              <p:cTn id="2" dur="indefinite" nodeType="mainSeq">
+                <p:childTnLst>
+                  <p:par>
+                    <p:cTn id="3" fill="hold">
+                      <p:stCondLst>
+                        <p:cond delay="indefinite"/>
+                      </p:stCondLst>
+                      <p:childTnLst>
+                        <p:par>
+                          <p:cTn id="4" fill="hold">
+                            <p:stCondLst>
+                              <p:cond delay="0"/>
+                            </p:stCondLst>
+                            <p:childTnLst>
+                              <p:par>
+                                <p:cTn id="5" presetID="10" presetClass="entr" presetSubtype="0" fill="hold" grpId="0" nodeType="clickEffect">
+                                  <p:stCondLst>
+                                    <p:cond delay="0"/>
+                                  </p:stCondLst>
+                                  <p:childTnLst>
+                                    <p:set>
+                                      <p:cBhvr>
+                                        <p:cTn id="6" dur="1" fill="hold">
+                                          <p:stCondLst>
+                                            <p:cond delay="0"/>
+                                          </p:stCondLst>
+                                        </p:cTn>
+                                        <p:tgtEl>
+                                          <p:spTgt spid="10"/>
+                                        </p:tgtEl>
+                                        <p:attrNameLst>
+                                          <p:attrName>style.visibility</p:attrName>
+                                        </p:attrNameLst>
+                                      </p:cBhvr>
+                                      <p:to>
+                                        <p:strVal val="visible"/>
+                                      </p:to>
+                                    </p:set>
+                                    <p:animEffect transition="in" filter="fade">
+                                      <p:cBhvr>
+                                        <p:cTn id="7" dur="500"/>
+                                        <p:tgtEl>
+                                          <p:spTgt spid="10"/>
+                                        </p:tgtEl>
+                                      </p:cBhvr>
+                                    </p:animEffect>
+                                  </p:childTnLst>
+                                </p:cTn>
+                              </p:par>
+                            </p:childTnLst>
+                          </p:cTn>
+                        </p:par>
+                      </p:childTnLst>
+                    </p:cTn>
+                  </p:par>
+                </p:childTnLst>
+              </p:cTn>
+              <p:prevCondLst>
+                <p:cond evt="onPrev" delay="0">
+                  <p:tgtEl>
+                    <p:sldTgt/>
+                  </p:tgtEl>
+                </p:cond>
+              </p:prevCondLst>
+              <p:nextCondLst>
+                <p:cond evt="onNext" delay="0">
+                  <p:tgtEl>
+                    <p:sldTgt/>
+                  </p:tgtEl>
+                </p:cond>
+              </p:nextCondLst>
+            </p:seq>
+          </p:childTnLst>
+        </p:cTn>
+      </p:par>
+    </p:tnLst>
+    <p:bldLst>
+      <p:bldP spid="10" grpId="0"/>
+    </p:bldLst>
+  </p:timing>
+</p:sld>
+</file>
+
+<file path=ppt/slides/slide24.xml><?xml version="1.0" encoding="utf-8"?>
+<p:sld xmlns:a="http://schemas.openxmlformats.org/drawingml/2006/main" xmlns:r="http://schemas.openxmlformats.org/officeDocument/2006/relationships" xmlns:p="http://schemas.openxmlformats.org/presentationml/2006/main">
+  <p:cSld>
+    <p:bg>
+      <p:bgPr>
+        <a:solidFill>
+          <a:schemeClr val="bg1"/>
+        </a:solidFill>
+        <a:effectLst/>
+      </p:bgPr>
+    </p:bg>
+    <p:spTree>
+      <p:nvGrpSpPr>
+        <p:cNvPr id="1" name=""/>
+        <p:cNvGrpSpPr/>
+        <p:nvPr/>
+      </p:nvGrpSpPr>
+      <p:grpSpPr>
+        <a:xfrm>
+          <a:off x="0" y="0"/>
+          <a:ext cx="0" cy="0"/>
+          <a:chOff x="0" y="0"/>
+          <a:chExt cx="0" cy="0"/>
+        </a:xfrm>
+      </p:grpSpPr>
+      <p:pic>
+        <p:nvPicPr>
+          <p:cNvPr id="18" name="Picture 8" descr="http://emanuelscirlet.com/uploads/powered/stdntpartner.bmp"/>
+          <p:cNvPicPr>
+            <a:picLocks noChangeAspect="1" noChangeArrowheads="1"/>
+          </p:cNvPicPr>
+          <p:nvPr/>
+        </p:nvPicPr>
+        <p:blipFill>
+          <a:blip r:embed="rId2" cstate="print">
+            <a:extLst>
+              <a:ext uri="{28A0092B-C50C-407E-A947-70E740481C1C}">
+                <a14:useLocalDpi xmlns:a14="http://schemas.microsoft.com/office/drawing/2010/main" val="0"/>
+              </a:ext>
+            </a:extLst>
+          </a:blip>
+          <a:srcRect/>
+          <a:stretch>
+            <a:fillRect/>
+          </a:stretch>
+        </p:blipFill>
+        <p:spPr bwMode="auto">
+          <a:xfrm>
+            <a:off x="8388969" y="12294552"/>
+            <a:ext cx="1073175" cy="200326"/>
+          </a:xfrm>
+          <a:prstGeom prst="rect">
+            <a:avLst/>
+          </a:prstGeom>
+          <a:noFill/>
+          <a:extLst>
+            <a:ext uri="{909E8E84-426E-40DD-AFC4-6F175D3DCCD1}">
+              <a14:hiddenFill xmlns:a14="http://schemas.microsoft.com/office/drawing/2010/main">
+                <a:solidFill>
+                  <a:srgbClr val="FFFFFF"/>
+                </a:solidFill>
+              </a14:hiddenFill>
+            </a:ext>
+          </a:extLst>
+        </p:spPr>
+      </p:pic>
+      <p:sp>
+        <p:nvSpPr>
+          <p:cNvPr id="21" name="TextBox 20"/>
+          <p:cNvSpPr txBox="1"/>
+          <p:nvPr/>
+        </p:nvSpPr>
+        <p:spPr>
+          <a:xfrm>
+            <a:off x="660363" y="694083"/>
+            <a:ext cx="8886446" cy="987706"/>
+          </a:xfrm>
+          <a:prstGeom prst="rect">
+            <a:avLst/>
+          </a:prstGeom>
+          <a:noFill/>
+        </p:spPr>
+        <p:txBody>
+          <a:bodyPr wrap="square" rtlCol="0">
+            <a:spAutoFit/>
+          </a:bodyPr>
+          <a:lstStyle/>
+          <a:p>
+            <a:pPr>
+              <a:lnSpc>
+                <a:spcPct val="130000"/>
+              </a:lnSpc>
+            </a:pPr>
+            <a:r>
+              <a:rPr lang="cs-CZ" sz="5000" b="1" dirty="0">
+                <a:latin typeface="Segoe UI Light" panose="020B0502040204020203" pitchFamily="34" charset="0"/>
+                <a:cs typeface="Segoe UI Light" panose="020B0502040204020203" pitchFamily="34" charset="0"/>
+              </a:rPr>
+              <a:t>Příklad 1 (jiné řešení)</a:t>
+            </a:r>
+          </a:p>
+        </p:txBody>
+      </p:sp>
+      <p:sp>
+        <p:nvSpPr>
+          <p:cNvPr id="28" name="Obdélník 27">
+            <a:extLst>
+              <a:ext uri="{FF2B5EF4-FFF2-40B4-BE49-F238E27FC236}">
+                <a16:creationId xmlns:a16="http://schemas.microsoft.com/office/drawing/2014/main" id="{0D083616-2E7C-C441-9883-F54FD30ED6F3}"/>
+              </a:ext>
+            </a:extLst>
+          </p:cNvPr>
+          <p:cNvSpPr/>
+          <p:nvPr/>
+        </p:nvSpPr>
+        <p:spPr>
+          <a:xfrm>
+            <a:off x="0" y="0"/>
+            <a:ext cx="12214209" cy="308634"/>
+          </a:xfrm>
+          <a:prstGeom prst="rect">
+            <a:avLst/>
+          </a:prstGeom>
+          <a:solidFill>
+            <a:srgbClr val="00ABEC"/>
+          </a:solidFill>
+          <a:ln>
+            <a:noFill/>
+          </a:ln>
+        </p:spPr>
+        <p:style>
+          <a:lnRef idx="2">
+            <a:schemeClr val="accent1">
+              <a:shade val="50000"/>
+            </a:schemeClr>
+          </a:lnRef>
+          <a:fillRef idx="1">
+            <a:schemeClr val="accent1"/>
+          </a:fillRef>
+          <a:effectRef idx="0">
+            <a:schemeClr val="accent1"/>
+          </a:effectRef>
+          <a:fontRef idx="minor">
+            <a:schemeClr val="lt1"/>
+          </a:fontRef>
+        </p:style>
+        <p:txBody>
+          <a:bodyPr rtlCol="0" anchor="ctr"/>
+          <a:lstStyle/>
+          <a:p>
+            <a:pPr algn="ctr"/>
+            <a:endParaRPr lang="cs-CZ"/>
+          </a:p>
+        </p:txBody>
+      </p:sp>
+      <p:sp>
+        <p:nvSpPr>
+          <p:cNvPr id="9" name="Obdélník 8">
+            <a:extLst>
+              <a:ext uri="{FF2B5EF4-FFF2-40B4-BE49-F238E27FC236}">
+                <a16:creationId xmlns:a16="http://schemas.microsoft.com/office/drawing/2014/main" id="{2B9DBF20-385D-4CFE-8417-2FA1BB959BD6}"/>
+              </a:ext>
+            </a:extLst>
+          </p:cNvPr>
+          <p:cNvSpPr/>
+          <p:nvPr/>
+        </p:nvSpPr>
+        <p:spPr>
+          <a:xfrm>
+            <a:off x="9317108" y="438416"/>
+            <a:ext cx="2856038" cy="461665"/>
+          </a:xfrm>
+          <a:prstGeom prst="rect">
+            <a:avLst/>
+          </a:prstGeom>
+        </p:spPr>
+        <p:txBody>
+          <a:bodyPr wrap="none">
+            <a:spAutoFit/>
+          </a:bodyPr>
+          <a:lstStyle/>
+          <a:p>
+            <a:r>
+              <a:rPr lang="cs-CZ" sz="2400" b="1" dirty="0" err="1">
+                <a:solidFill>
+                  <a:srgbClr val="00ABEC"/>
+                </a:solidFill>
+                <a:latin typeface="Segoe UI Semilight" panose="020B0402040204020203" pitchFamily="34" charset="0"/>
+                <a:cs typeface="Segoe UI Semilight" panose="020B0402040204020203" pitchFamily="34" charset="0"/>
+              </a:rPr>
+              <a:t>CHANGE</a:t>
+            </a:r>
+            <a:r>
+              <a:rPr lang="cs-CZ" sz="2400" b="1" dirty="0">
+                <a:solidFill>
+                  <a:srgbClr val="00ABEC"/>
+                </a:solidFill>
+                <a:latin typeface="Segoe UI Semilight" panose="020B0402040204020203" pitchFamily="34" charset="0"/>
+                <a:cs typeface="Segoe UI Semilight" panose="020B0402040204020203" pitchFamily="34" charset="0"/>
+              </a:rPr>
+              <a:t> </a:t>
+            </a:r>
+            <a:r>
+              <a:rPr lang="cs-CZ" sz="2400" b="1" dirty="0" err="1">
+                <a:solidFill>
+                  <a:srgbClr val="00ABEC"/>
+                </a:solidFill>
+                <a:latin typeface="Segoe UI Semilight" panose="020B0402040204020203" pitchFamily="34" charset="0"/>
+                <a:cs typeface="Segoe UI Semilight" panose="020B0402040204020203" pitchFamily="34" charset="0"/>
+              </a:rPr>
+              <a:t>TRACKING</a:t>
+            </a:r>
+            <a:endParaRPr lang="cs-CZ" sz="2400" dirty="0"/>
+          </a:p>
+        </p:txBody>
+      </p:sp>
+      <p:sp>
+        <p:nvSpPr>
+          <p:cNvPr id="4" name="Obdélník 3">
+            <a:extLst>
+              <a:ext uri="{FF2B5EF4-FFF2-40B4-BE49-F238E27FC236}">
+                <a16:creationId xmlns:a16="http://schemas.microsoft.com/office/drawing/2014/main" id="{EC240F4E-51A2-420C-AB8C-F8CEC44960DC}"/>
+              </a:ext>
+            </a:extLst>
+          </p:cNvPr>
+          <p:cNvSpPr/>
+          <p:nvPr/>
+        </p:nvSpPr>
+        <p:spPr>
+          <a:xfrm>
+            <a:off x="729007" y="1848475"/>
+            <a:ext cx="6096000" cy="5078313"/>
+          </a:xfrm>
+          <a:prstGeom prst="rect">
+            <a:avLst/>
+          </a:prstGeom>
+        </p:spPr>
+        <p:txBody>
+          <a:bodyPr>
+            <a:spAutoFit/>
+          </a:bodyPr>
+          <a:lstStyle/>
+          <a:p>
+            <a:r>
+              <a:rPr lang="cs-CZ" dirty="0" err="1">
+                <a:solidFill>
+                  <a:schemeClr val="bg1">
+                    <a:lumMod val="65000"/>
+                  </a:schemeClr>
+                </a:solidFill>
+              </a:rPr>
+              <a:t>using</a:t>
+            </a:r>
+            <a:r>
+              <a:rPr lang="cs-CZ" dirty="0">
+                <a:solidFill>
+                  <a:schemeClr val="bg1">
+                    <a:lumMod val="65000"/>
+                  </a:schemeClr>
+                </a:solidFill>
+              </a:rPr>
+              <a:t> (var </a:t>
+            </a:r>
+            <a:r>
+              <a:rPr lang="cs-CZ" dirty="0" err="1">
+                <a:solidFill>
+                  <a:schemeClr val="bg1">
+                    <a:lumMod val="65000"/>
+                  </a:schemeClr>
+                </a:solidFill>
+              </a:rPr>
+              <a:t>context</a:t>
+            </a:r>
+            <a:r>
+              <a:rPr lang="cs-CZ" dirty="0">
+                <a:solidFill>
+                  <a:schemeClr val="bg1">
+                    <a:lumMod val="65000"/>
+                  </a:schemeClr>
+                </a:solidFill>
+              </a:rPr>
+              <a:t> = </a:t>
+            </a:r>
+            <a:r>
+              <a:rPr lang="cs-CZ" dirty="0" err="1">
+                <a:solidFill>
+                  <a:schemeClr val="bg1">
+                    <a:lumMod val="65000"/>
+                  </a:schemeClr>
+                </a:solidFill>
+              </a:rPr>
+              <a:t>new</a:t>
+            </a:r>
+            <a:r>
+              <a:rPr lang="cs-CZ" dirty="0">
+                <a:solidFill>
+                  <a:schemeClr val="bg1">
+                    <a:lumMod val="65000"/>
+                  </a:schemeClr>
+                </a:solidFill>
+              </a:rPr>
+              <a:t> </a:t>
+            </a:r>
+            <a:r>
+              <a:rPr lang="cs-CZ" dirty="0" err="1">
+                <a:solidFill>
+                  <a:schemeClr val="bg1">
+                    <a:lumMod val="65000"/>
+                  </a:schemeClr>
+                </a:solidFill>
+              </a:rPr>
+              <a:t>BloggingContext</a:t>
+            </a:r>
+            <a:r>
+              <a:rPr lang="cs-CZ" dirty="0">
+                <a:solidFill>
+                  <a:schemeClr val="bg1">
+                    <a:lumMod val="65000"/>
+                  </a:schemeClr>
+                </a:solidFill>
+              </a:rPr>
+              <a:t>())</a:t>
+            </a:r>
+          </a:p>
+          <a:p>
+            <a:r>
+              <a:rPr lang="cs-CZ" dirty="0">
+                <a:solidFill>
+                  <a:schemeClr val="bg1">
+                    <a:lumMod val="65000"/>
+                  </a:schemeClr>
+                </a:solidFill>
+              </a:rPr>
+              <a:t>{</a:t>
+            </a:r>
+          </a:p>
+          <a:p>
+            <a:r>
+              <a:rPr lang="cs-CZ" dirty="0">
+                <a:solidFill>
+                  <a:schemeClr val="bg1">
+                    <a:lumMod val="65000"/>
+                  </a:schemeClr>
+                </a:solidFill>
+              </a:rPr>
+              <a:t>    </a:t>
+            </a:r>
+            <a:r>
+              <a:rPr lang="cs-CZ" dirty="0" err="1">
+                <a:solidFill>
+                  <a:schemeClr val="bg1">
+                    <a:lumMod val="65000"/>
+                  </a:schemeClr>
+                </a:solidFill>
+              </a:rPr>
+              <a:t>try</a:t>
+            </a:r>
+            <a:endParaRPr lang="cs-CZ" dirty="0">
+              <a:solidFill>
+                <a:schemeClr val="bg1">
+                  <a:lumMod val="65000"/>
+                </a:schemeClr>
+              </a:solidFill>
+            </a:endParaRPr>
+          </a:p>
+          <a:p>
+            <a:r>
+              <a:rPr lang="cs-CZ" dirty="0">
+                <a:solidFill>
+                  <a:schemeClr val="bg1">
+                    <a:lumMod val="65000"/>
+                  </a:schemeClr>
+                </a:solidFill>
+              </a:rPr>
+              <a:t>    {</a:t>
+            </a:r>
+          </a:p>
+          <a:p>
+            <a:r>
+              <a:rPr lang="cs-CZ" dirty="0"/>
+              <a:t>    	List&lt;Blog&gt; </a:t>
+            </a:r>
+            <a:r>
+              <a:rPr lang="cs-CZ" dirty="0" err="1"/>
+              <a:t>blogsToAdd</a:t>
+            </a:r>
+            <a:r>
+              <a:rPr lang="cs-CZ" dirty="0"/>
+              <a:t> = </a:t>
+            </a:r>
+            <a:r>
+              <a:rPr lang="cs-CZ" dirty="0" err="1"/>
+              <a:t>new</a:t>
+            </a:r>
+            <a:r>
+              <a:rPr lang="cs-CZ" dirty="0"/>
+              <a:t> List&lt;Blog&gt;();</a:t>
+            </a:r>
+          </a:p>
+          <a:p>
+            <a:r>
+              <a:rPr lang="cs-CZ" dirty="0"/>
+              <a:t>	</a:t>
+            </a:r>
+            <a:r>
+              <a:rPr lang="cs-CZ" dirty="0" err="1"/>
+              <a:t>foreach</a:t>
+            </a:r>
+            <a:r>
+              <a:rPr lang="cs-CZ" dirty="0"/>
+              <a:t> (var blog in </a:t>
+            </a:r>
+            <a:r>
+              <a:rPr lang="cs-CZ" dirty="0" err="1"/>
+              <a:t>aLotOfBlogs</a:t>
+            </a:r>
+            <a:r>
+              <a:rPr lang="cs-CZ" dirty="0"/>
+              <a:t>)</a:t>
+            </a:r>
+          </a:p>
+          <a:p>
+            <a:r>
+              <a:rPr lang="cs-CZ" dirty="0"/>
+              <a:t>       	{</a:t>
+            </a:r>
+          </a:p>
+          <a:p>
+            <a:r>
+              <a:rPr lang="cs-CZ" dirty="0"/>
+              <a:t>       	      </a:t>
+            </a:r>
+            <a:r>
+              <a:rPr lang="cs-CZ" dirty="0" err="1"/>
+              <a:t>blogsToAdd.Add</a:t>
+            </a:r>
+            <a:r>
+              <a:rPr lang="cs-CZ" dirty="0"/>
+              <a:t>(blog);</a:t>
+            </a:r>
+          </a:p>
+          <a:p>
+            <a:r>
+              <a:rPr lang="cs-CZ" dirty="0"/>
+              <a:t>       	}</a:t>
+            </a:r>
+          </a:p>
+          <a:p>
+            <a:endParaRPr lang="cs-CZ" dirty="0"/>
+          </a:p>
+          <a:p>
+            <a:r>
+              <a:rPr lang="cs-CZ" dirty="0"/>
+              <a:t>       	</a:t>
+            </a:r>
+            <a:r>
+              <a:rPr lang="cs-CZ" dirty="0" err="1"/>
+              <a:t>context.Blogs.AddRange</a:t>
+            </a:r>
+            <a:r>
+              <a:rPr lang="cs-CZ" dirty="0"/>
+              <a:t>(</a:t>
+            </a:r>
+            <a:r>
+              <a:rPr lang="cs-CZ" dirty="0" err="1"/>
+              <a:t>blogsToAdd</a:t>
+            </a:r>
+            <a:r>
+              <a:rPr lang="cs-CZ" dirty="0"/>
+              <a:t>);</a:t>
+            </a:r>
+          </a:p>
+          <a:p>
+            <a:r>
+              <a:rPr lang="cs-CZ" dirty="0">
+                <a:solidFill>
+                  <a:schemeClr val="bg1">
+                    <a:lumMod val="65000"/>
+                  </a:schemeClr>
+                </a:solidFill>
+              </a:rPr>
+              <a:t>        </a:t>
+            </a:r>
+          </a:p>
+          <a:p>
+            <a:r>
+              <a:rPr lang="cs-CZ" dirty="0">
+                <a:solidFill>
+                  <a:schemeClr val="bg1">
+                    <a:lumMod val="65000"/>
+                  </a:schemeClr>
+                </a:solidFill>
+              </a:rPr>
+              <a:t>    }</a:t>
+            </a:r>
+          </a:p>
+          <a:p>
+            <a:r>
+              <a:rPr lang="cs-CZ" dirty="0">
+                <a:solidFill>
+                  <a:schemeClr val="bg1">
+                    <a:lumMod val="65000"/>
+                  </a:schemeClr>
+                </a:solidFill>
+              </a:rPr>
+              <a:t>    </a:t>
+            </a:r>
+            <a:r>
+              <a:rPr lang="cs-CZ" dirty="0" err="1">
+                <a:solidFill>
+                  <a:schemeClr val="bg1">
+                    <a:lumMod val="65000"/>
+                  </a:schemeClr>
+                </a:solidFill>
+              </a:rPr>
+              <a:t>finally</a:t>
+            </a:r>
+            <a:endParaRPr lang="cs-CZ" dirty="0">
+              <a:solidFill>
+                <a:schemeClr val="bg1">
+                  <a:lumMod val="65000"/>
+                </a:schemeClr>
+              </a:solidFill>
+            </a:endParaRPr>
+          </a:p>
+          <a:p>
+            <a:r>
+              <a:rPr lang="cs-CZ" dirty="0">
+                <a:solidFill>
+                  <a:schemeClr val="bg1">
+                    <a:lumMod val="65000"/>
+                  </a:schemeClr>
+                </a:solidFill>
+              </a:rPr>
+              <a:t>    {</a:t>
+            </a:r>
+          </a:p>
+          <a:p>
+            <a:r>
+              <a:rPr lang="cs-CZ" dirty="0">
+                <a:solidFill>
+                  <a:schemeClr val="bg1">
+                    <a:lumMod val="65000"/>
+                  </a:schemeClr>
+                </a:solidFill>
+              </a:rPr>
+              <a:t> </a:t>
+            </a:r>
+          </a:p>
+          <a:p>
+            <a:r>
+              <a:rPr lang="cs-CZ" dirty="0">
+                <a:solidFill>
+                  <a:schemeClr val="bg1">
+                    <a:lumMod val="65000"/>
+                  </a:schemeClr>
+                </a:solidFill>
+              </a:rPr>
+              <a:t>    }</a:t>
+            </a:r>
+          </a:p>
+          <a:p>
+            <a:r>
+              <a:rPr lang="cs-CZ" dirty="0">
+                <a:solidFill>
+                  <a:schemeClr val="bg1">
+                    <a:lumMod val="65000"/>
+                  </a:schemeClr>
+                </a:solidFill>
+              </a:rPr>
+              <a:t>}</a:t>
+            </a:r>
+          </a:p>
+        </p:txBody>
+      </p:sp>
+    </p:spTree>
+    <p:extLst>
+      <p:ext uri="{BB962C8B-B14F-4D97-AF65-F5344CB8AC3E}">
+        <p14:creationId xmlns:p14="http://schemas.microsoft.com/office/powerpoint/2010/main" val="2414797770"/>
+      </p:ext>
+    </p:extLst>
+  </p:cSld>
+  <p:clrMapOvr>
+    <a:masterClrMapping/>
+  </p:clrMapOvr>
+  <mc:AlternateContent xmlns:mc="http://schemas.openxmlformats.org/markup-compatibility/2006" xmlns:p14="http://schemas.microsoft.com/office/powerpoint/2010/main">
+    <mc:Choice Requires="p14">
+      <p:transition spd="slow" p14:dur="1300">
+        <p14:pan dir="u"/>
+      </p:transition>
+    </mc:Choice>
+    <mc:Fallback xmlns="">
+      <p:transition spd="slow">
+        <p:fade/>
+      </p:transition>
+    </mc:Fallback>
+  </mc:AlternateContent>
+</p:sld>
+</file>
+
+<file path=ppt/slides/slide25.xml><?xml version="1.0" encoding="utf-8"?>
+<p:sld xmlns:a="http://schemas.openxmlformats.org/drawingml/2006/main" xmlns:r="http://schemas.openxmlformats.org/officeDocument/2006/relationships" xmlns:p="http://schemas.openxmlformats.org/presentationml/2006/main">
+  <p:cSld>
+    <p:bg>
+      <p:bgPr>
+        <a:solidFill>
+          <a:schemeClr val="bg1"/>
+        </a:solidFill>
+        <a:effectLst/>
+      </p:bgPr>
+    </p:bg>
+    <p:spTree>
+      <p:nvGrpSpPr>
+        <p:cNvPr id="1" name=""/>
+        <p:cNvGrpSpPr/>
+        <p:nvPr/>
+      </p:nvGrpSpPr>
+      <p:grpSpPr>
+        <a:xfrm>
+          <a:off x="0" y="0"/>
+          <a:ext cx="0" cy="0"/>
+          <a:chOff x="0" y="0"/>
+          <a:chExt cx="0" cy="0"/>
+        </a:xfrm>
+      </p:grpSpPr>
+      <p:pic>
+        <p:nvPicPr>
+          <p:cNvPr id="18" name="Picture 8" descr="http://emanuelscirlet.com/uploads/powered/stdntpartner.bmp"/>
+          <p:cNvPicPr>
+            <a:picLocks noChangeAspect="1" noChangeArrowheads="1"/>
+          </p:cNvPicPr>
+          <p:nvPr/>
+        </p:nvPicPr>
+        <p:blipFill>
+          <a:blip r:embed="rId2" cstate="print">
+            <a:extLst>
+              <a:ext uri="{28A0092B-C50C-407E-A947-70E740481C1C}">
+                <a14:useLocalDpi xmlns:a14="http://schemas.microsoft.com/office/drawing/2010/main" val="0"/>
+              </a:ext>
+            </a:extLst>
+          </a:blip>
+          <a:srcRect/>
+          <a:stretch>
+            <a:fillRect/>
+          </a:stretch>
+        </p:blipFill>
+        <p:spPr bwMode="auto">
+          <a:xfrm>
+            <a:off x="8388969" y="12294552"/>
+            <a:ext cx="1073175" cy="200326"/>
+          </a:xfrm>
+          <a:prstGeom prst="rect">
+            <a:avLst/>
+          </a:prstGeom>
+          <a:noFill/>
+          <a:extLst>
+            <a:ext uri="{909E8E84-426E-40DD-AFC4-6F175D3DCCD1}">
+              <a14:hiddenFill xmlns:a14="http://schemas.microsoft.com/office/drawing/2010/main">
+                <a:solidFill>
+                  <a:srgbClr val="FFFFFF"/>
+                </a:solidFill>
+              </a14:hiddenFill>
+            </a:ext>
+          </a:extLst>
+        </p:spPr>
+      </p:pic>
+      <p:sp>
+        <p:nvSpPr>
+          <p:cNvPr id="21" name="TextBox 20"/>
+          <p:cNvSpPr txBox="1"/>
+          <p:nvPr/>
+        </p:nvSpPr>
+        <p:spPr>
+          <a:xfrm>
+            <a:off x="660363" y="694083"/>
+            <a:ext cx="8886446" cy="987706"/>
+          </a:xfrm>
+          <a:prstGeom prst="rect">
+            <a:avLst/>
+          </a:prstGeom>
+          <a:noFill/>
+        </p:spPr>
+        <p:txBody>
+          <a:bodyPr wrap="square" rtlCol="0">
+            <a:spAutoFit/>
+          </a:bodyPr>
+          <a:lstStyle/>
+          <a:p>
+            <a:pPr>
+              <a:lnSpc>
+                <a:spcPct val="130000"/>
+              </a:lnSpc>
+            </a:pPr>
+            <a:r>
+              <a:rPr lang="cs-CZ" sz="5000" b="1" dirty="0">
+                <a:latin typeface="Segoe UI Light" panose="020B0502040204020203" pitchFamily="34" charset="0"/>
+                <a:cs typeface="Segoe UI Light" panose="020B0502040204020203" pitchFamily="34" charset="0"/>
+              </a:rPr>
+              <a:t>Entity </a:t>
+            </a:r>
+            <a:r>
+              <a:rPr lang="cs-CZ" sz="5000" b="1" dirty="0" err="1">
+                <a:latin typeface="Segoe UI Light" panose="020B0502040204020203" pitchFamily="34" charset="0"/>
+                <a:cs typeface="Segoe UI Light" panose="020B0502040204020203" pitchFamily="34" charset="0"/>
+              </a:rPr>
+              <a:t>State</a:t>
+            </a:r>
+            <a:endParaRPr lang="cs-CZ" sz="5000" b="1" dirty="0">
+              <a:latin typeface="Segoe UI Light" panose="020B0502040204020203" pitchFamily="34" charset="0"/>
+              <a:cs typeface="Segoe UI Light" panose="020B0502040204020203" pitchFamily="34" charset="0"/>
+            </a:endParaRPr>
+          </a:p>
+        </p:txBody>
+      </p:sp>
+      <p:sp>
+        <p:nvSpPr>
+          <p:cNvPr id="28" name="Obdélník 27">
+            <a:extLst>
+              <a:ext uri="{FF2B5EF4-FFF2-40B4-BE49-F238E27FC236}">
+                <a16:creationId xmlns:a16="http://schemas.microsoft.com/office/drawing/2014/main" id="{0D083616-2E7C-C441-9883-F54FD30ED6F3}"/>
+              </a:ext>
+            </a:extLst>
+          </p:cNvPr>
+          <p:cNvSpPr/>
+          <p:nvPr/>
+        </p:nvSpPr>
+        <p:spPr>
+          <a:xfrm>
+            <a:off x="0" y="0"/>
+            <a:ext cx="12214209" cy="308634"/>
+          </a:xfrm>
+          <a:prstGeom prst="rect">
+            <a:avLst/>
+          </a:prstGeom>
+          <a:solidFill>
+            <a:srgbClr val="00ABEC"/>
+          </a:solidFill>
+          <a:ln>
+            <a:noFill/>
+          </a:ln>
+        </p:spPr>
+        <p:style>
+          <a:lnRef idx="2">
+            <a:schemeClr val="accent1">
+              <a:shade val="50000"/>
+            </a:schemeClr>
+          </a:lnRef>
+          <a:fillRef idx="1">
+            <a:schemeClr val="accent1"/>
+          </a:fillRef>
+          <a:effectRef idx="0">
+            <a:schemeClr val="accent1"/>
+          </a:effectRef>
+          <a:fontRef idx="minor">
+            <a:schemeClr val="lt1"/>
+          </a:fontRef>
+        </p:style>
+        <p:txBody>
+          <a:bodyPr rtlCol="0" anchor="ctr"/>
+          <a:lstStyle/>
+          <a:p>
+            <a:pPr algn="ctr"/>
+            <a:endParaRPr lang="cs-CZ"/>
+          </a:p>
+        </p:txBody>
+      </p:sp>
+      <p:sp>
+        <p:nvSpPr>
+          <p:cNvPr id="8" name="TextBox 18">
+            <a:extLst>
+              <a:ext uri="{FF2B5EF4-FFF2-40B4-BE49-F238E27FC236}">
+                <a16:creationId xmlns:a16="http://schemas.microsoft.com/office/drawing/2014/main" id="{DF113CC3-4A88-3B47-BBA8-C063F23D7D57}"/>
+              </a:ext>
+            </a:extLst>
+          </p:cNvPr>
+          <p:cNvSpPr txBox="1"/>
+          <p:nvPr/>
+        </p:nvSpPr>
+        <p:spPr>
+          <a:xfrm>
+            <a:off x="750094" y="2067238"/>
+            <a:ext cx="11059833" cy="1066895"/>
+          </a:xfrm>
+          <a:prstGeom prst="rect">
+            <a:avLst/>
+          </a:prstGeom>
+          <a:noFill/>
+        </p:spPr>
+        <p:txBody>
+          <a:bodyPr wrap="square" rtlCol="0">
+            <a:spAutoFit/>
+          </a:bodyPr>
+          <a:lstStyle/>
+          <a:p>
+            <a:pPr marL="342900" indent="-342900">
+              <a:lnSpc>
+                <a:spcPct val="140000"/>
+              </a:lnSpc>
+              <a:buFontTx/>
+              <a:buChar char="-"/>
+            </a:pPr>
+            <a:r>
+              <a:rPr lang="cs-CZ" sz="2400" dirty="0">
+                <a:latin typeface="Segoe UI Semilight" panose="020B0402040204020203" pitchFamily="34" charset="0"/>
+                <a:cs typeface="Segoe UI Semilight" panose="020B0402040204020203" pitchFamily="34" charset="0"/>
+              </a:rPr>
+              <a:t>Každá entita má svůj stav, obvykle detekován přes </a:t>
+            </a:r>
+            <a:r>
+              <a:rPr lang="cs-CZ" sz="2400" dirty="0" err="1">
+                <a:latin typeface="Segoe UI Semilight" panose="020B0402040204020203" pitchFamily="34" charset="0"/>
+                <a:cs typeface="Segoe UI Semilight" panose="020B0402040204020203" pitchFamily="34" charset="0"/>
+              </a:rPr>
+              <a:t>CH.T</a:t>
+            </a:r>
+            <a:r>
+              <a:rPr lang="cs-CZ" sz="2400" dirty="0">
+                <a:latin typeface="Segoe UI Semilight" panose="020B0402040204020203" pitchFamily="34" charset="0"/>
+                <a:cs typeface="Segoe UI Semilight" panose="020B0402040204020203" pitchFamily="34" charset="0"/>
+              </a:rPr>
+              <a:t>. / </a:t>
+            </a:r>
+            <a:r>
+              <a:rPr lang="cs-CZ" sz="2400" dirty="0" err="1">
+                <a:latin typeface="Segoe UI Semilight" panose="020B0402040204020203" pitchFamily="34" charset="0"/>
+                <a:cs typeface="Segoe UI Semilight" panose="020B0402040204020203" pitchFamily="34" charset="0"/>
+              </a:rPr>
+              <a:t>Detect</a:t>
+            </a:r>
+            <a:r>
+              <a:rPr lang="cs-CZ" sz="2400" dirty="0">
+                <a:latin typeface="Segoe UI Semilight" panose="020B0402040204020203" pitchFamily="34" charset="0"/>
+                <a:cs typeface="Segoe UI Semilight" panose="020B0402040204020203" pitchFamily="34" charset="0"/>
+              </a:rPr>
+              <a:t> </a:t>
+            </a:r>
+            <a:r>
+              <a:rPr lang="cs-CZ" sz="2400" dirty="0" err="1">
+                <a:latin typeface="Segoe UI Semilight" panose="020B0402040204020203" pitchFamily="34" charset="0"/>
+                <a:cs typeface="Segoe UI Semilight" panose="020B0402040204020203" pitchFamily="34" charset="0"/>
+              </a:rPr>
+              <a:t>Changes</a:t>
+            </a:r>
+            <a:endParaRPr lang="cs-CZ" sz="2400" dirty="0">
+              <a:latin typeface="Segoe UI Semilight" panose="020B0402040204020203" pitchFamily="34" charset="0"/>
+              <a:cs typeface="Segoe UI Semilight" panose="020B0402040204020203" pitchFamily="34" charset="0"/>
+            </a:endParaRPr>
+          </a:p>
+          <a:p>
+            <a:pPr marL="342900" indent="-342900">
+              <a:lnSpc>
+                <a:spcPct val="140000"/>
+              </a:lnSpc>
+              <a:buFontTx/>
+              <a:buChar char="-"/>
+            </a:pPr>
+            <a:r>
+              <a:rPr lang="cs-CZ" sz="2400" dirty="0">
+                <a:latin typeface="Segoe UI Semilight" panose="020B0402040204020203" pitchFamily="34" charset="0"/>
+                <a:cs typeface="Segoe UI Semilight" panose="020B0402040204020203" pitchFamily="34" charset="0"/>
+              </a:rPr>
+              <a:t>Stav se nastavuje implicitně, ale můžeme jej změnit i ručně</a:t>
+            </a:r>
+            <a:endParaRPr lang="en-US" sz="2400" dirty="0">
+              <a:latin typeface="Segoe UI Semilight" panose="020B0402040204020203" pitchFamily="34" charset="0"/>
+              <a:cs typeface="Segoe UI Semilight" panose="020B0402040204020203" pitchFamily="34" charset="0"/>
+            </a:endParaRPr>
+          </a:p>
+        </p:txBody>
+      </p:sp>
+      <p:sp>
+        <p:nvSpPr>
+          <p:cNvPr id="9" name="Obdélník 8">
+            <a:extLst>
+              <a:ext uri="{FF2B5EF4-FFF2-40B4-BE49-F238E27FC236}">
+                <a16:creationId xmlns:a16="http://schemas.microsoft.com/office/drawing/2014/main" id="{2B9DBF20-385D-4CFE-8417-2FA1BB959BD6}"/>
+              </a:ext>
+            </a:extLst>
+          </p:cNvPr>
+          <p:cNvSpPr/>
+          <p:nvPr/>
+        </p:nvSpPr>
+        <p:spPr>
+          <a:xfrm>
+            <a:off x="9317108" y="438416"/>
+            <a:ext cx="2856038" cy="461665"/>
+          </a:xfrm>
+          <a:prstGeom prst="rect">
+            <a:avLst/>
+          </a:prstGeom>
+        </p:spPr>
+        <p:txBody>
+          <a:bodyPr wrap="none">
+            <a:spAutoFit/>
+          </a:bodyPr>
+          <a:lstStyle/>
+          <a:p>
+            <a:r>
+              <a:rPr lang="cs-CZ" sz="2400" b="1" dirty="0" err="1">
+                <a:solidFill>
+                  <a:srgbClr val="00ABEC"/>
+                </a:solidFill>
+                <a:latin typeface="Segoe UI Semilight" panose="020B0402040204020203" pitchFamily="34" charset="0"/>
+                <a:cs typeface="Segoe UI Semilight" panose="020B0402040204020203" pitchFamily="34" charset="0"/>
+              </a:rPr>
+              <a:t>CHANGE</a:t>
+            </a:r>
+            <a:r>
+              <a:rPr lang="cs-CZ" sz="2400" b="1" dirty="0">
+                <a:solidFill>
+                  <a:srgbClr val="00ABEC"/>
+                </a:solidFill>
+                <a:latin typeface="Segoe UI Semilight" panose="020B0402040204020203" pitchFamily="34" charset="0"/>
+                <a:cs typeface="Segoe UI Semilight" panose="020B0402040204020203" pitchFamily="34" charset="0"/>
+              </a:rPr>
+              <a:t> </a:t>
+            </a:r>
+            <a:r>
+              <a:rPr lang="cs-CZ" sz="2400" b="1" dirty="0" err="1">
+                <a:solidFill>
+                  <a:srgbClr val="00ABEC"/>
+                </a:solidFill>
+                <a:latin typeface="Segoe UI Semilight" panose="020B0402040204020203" pitchFamily="34" charset="0"/>
+                <a:cs typeface="Segoe UI Semilight" panose="020B0402040204020203" pitchFamily="34" charset="0"/>
+              </a:rPr>
+              <a:t>TRACKING</a:t>
+            </a:r>
+            <a:endParaRPr lang="cs-CZ" sz="2400" dirty="0"/>
+          </a:p>
+        </p:txBody>
+      </p:sp>
+      <p:sp>
+        <p:nvSpPr>
+          <p:cNvPr id="2" name="Obdélník 1">
+            <a:extLst>
+              <a:ext uri="{FF2B5EF4-FFF2-40B4-BE49-F238E27FC236}">
+                <a16:creationId xmlns:a16="http://schemas.microsoft.com/office/drawing/2014/main" id="{D261E632-A1ED-41A0-9B80-B89CBB6B7A8C}"/>
+              </a:ext>
+            </a:extLst>
+          </p:cNvPr>
+          <p:cNvSpPr/>
+          <p:nvPr/>
+        </p:nvSpPr>
+        <p:spPr>
+          <a:xfrm>
+            <a:off x="1106078" y="3424127"/>
+            <a:ext cx="6096000" cy="1754326"/>
+          </a:xfrm>
+          <a:prstGeom prst="rect">
+            <a:avLst/>
+          </a:prstGeom>
+        </p:spPr>
+        <p:txBody>
+          <a:bodyPr>
+            <a:spAutoFit/>
+          </a:bodyPr>
+          <a:lstStyle/>
+          <a:p>
+            <a:r>
+              <a:rPr lang="cs-CZ" dirty="0" err="1"/>
+              <a:t>using</a:t>
+            </a:r>
+            <a:r>
+              <a:rPr lang="cs-CZ" dirty="0"/>
+              <a:t> (var </a:t>
+            </a:r>
+            <a:r>
+              <a:rPr lang="cs-CZ" dirty="0" err="1"/>
+              <a:t>context</a:t>
+            </a:r>
+            <a:r>
+              <a:rPr lang="cs-CZ" dirty="0"/>
+              <a:t> = </a:t>
+            </a:r>
+            <a:r>
+              <a:rPr lang="cs-CZ" dirty="0" err="1"/>
+              <a:t>new</a:t>
+            </a:r>
+            <a:r>
+              <a:rPr lang="cs-CZ" dirty="0"/>
+              <a:t> </a:t>
+            </a:r>
+            <a:r>
+              <a:rPr lang="cs-CZ" dirty="0" err="1"/>
+              <a:t>BloggingContext</a:t>
+            </a:r>
+            <a:r>
+              <a:rPr lang="cs-CZ" dirty="0"/>
+              <a:t>())</a:t>
+            </a:r>
+          </a:p>
+          <a:p>
+            <a:r>
+              <a:rPr lang="cs-CZ" dirty="0"/>
+              <a:t>{</a:t>
+            </a:r>
+          </a:p>
+          <a:p>
+            <a:r>
+              <a:rPr lang="cs-CZ" dirty="0"/>
+              <a:t>    var blog = </a:t>
+            </a:r>
+            <a:r>
+              <a:rPr lang="cs-CZ" dirty="0" err="1"/>
+              <a:t>new</a:t>
+            </a:r>
+            <a:r>
+              <a:rPr lang="cs-CZ" dirty="0"/>
+              <a:t> Blog { Name = "ADO.NET Blog" };</a:t>
+            </a:r>
+          </a:p>
+          <a:p>
+            <a:r>
+              <a:rPr lang="cs-CZ" dirty="0"/>
+              <a:t>    </a:t>
+            </a:r>
+            <a:r>
+              <a:rPr lang="cs-CZ" dirty="0" err="1"/>
+              <a:t>context.Blogs.</a:t>
+            </a:r>
+            <a:r>
+              <a:rPr lang="cs-CZ" dirty="0" err="1">
+                <a:solidFill>
+                  <a:srgbClr val="FF0000"/>
+                </a:solidFill>
+              </a:rPr>
+              <a:t>Add</a:t>
+            </a:r>
+            <a:r>
+              <a:rPr lang="cs-CZ" dirty="0"/>
+              <a:t>(blog);</a:t>
+            </a:r>
+          </a:p>
+          <a:p>
+            <a:r>
+              <a:rPr lang="cs-CZ" dirty="0"/>
+              <a:t>    </a:t>
+            </a:r>
+            <a:r>
+              <a:rPr lang="cs-CZ" dirty="0" err="1"/>
+              <a:t>context.SaveChanges</a:t>
+            </a:r>
+            <a:r>
+              <a:rPr lang="cs-CZ" dirty="0"/>
+              <a:t>();</a:t>
+            </a:r>
+          </a:p>
+          <a:p>
+            <a:r>
+              <a:rPr lang="cs-CZ" dirty="0"/>
+              <a:t>}</a:t>
+            </a:r>
+          </a:p>
+        </p:txBody>
+      </p:sp>
+      <p:sp>
+        <p:nvSpPr>
+          <p:cNvPr id="4" name="Obdélník 3">
+            <a:extLst>
+              <a:ext uri="{FF2B5EF4-FFF2-40B4-BE49-F238E27FC236}">
+                <a16:creationId xmlns:a16="http://schemas.microsoft.com/office/drawing/2014/main" id="{C0DC27DA-95CD-4651-91E0-90D69BBCA20D}"/>
+              </a:ext>
+            </a:extLst>
+          </p:cNvPr>
+          <p:cNvSpPr/>
+          <p:nvPr/>
+        </p:nvSpPr>
+        <p:spPr>
+          <a:xfrm>
+            <a:off x="6280010" y="4853794"/>
+            <a:ext cx="5164605" cy="1754326"/>
+          </a:xfrm>
+          <a:prstGeom prst="rect">
+            <a:avLst/>
+          </a:prstGeom>
+        </p:spPr>
+        <p:txBody>
+          <a:bodyPr wrap="square">
+            <a:spAutoFit/>
+          </a:bodyPr>
+          <a:lstStyle/>
+          <a:p>
+            <a:r>
+              <a:rPr lang="cs-CZ" dirty="0" err="1"/>
+              <a:t>using</a:t>
+            </a:r>
+            <a:r>
+              <a:rPr lang="cs-CZ" dirty="0"/>
+              <a:t> (var </a:t>
+            </a:r>
+            <a:r>
+              <a:rPr lang="cs-CZ" dirty="0" err="1"/>
+              <a:t>context</a:t>
+            </a:r>
+            <a:r>
+              <a:rPr lang="cs-CZ" dirty="0"/>
+              <a:t> = </a:t>
+            </a:r>
+            <a:r>
+              <a:rPr lang="cs-CZ" dirty="0" err="1"/>
+              <a:t>new</a:t>
+            </a:r>
+            <a:r>
+              <a:rPr lang="cs-CZ" dirty="0"/>
+              <a:t> </a:t>
+            </a:r>
+            <a:r>
+              <a:rPr lang="cs-CZ" dirty="0" err="1"/>
+              <a:t>BloggingContext</a:t>
+            </a:r>
+            <a:r>
+              <a:rPr lang="cs-CZ" dirty="0"/>
+              <a:t>())</a:t>
+            </a:r>
+          </a:p>
+          <a:p>
+            <a:r>
+              <a:rPr lang="cs-CZ" dirty="0"/>
+              <a:t>{</a:t>
+            </a:r>
+          </a:p>
+          <a:p>
+            <a:r>
+              <a:rPr lang="cs-CZ" dirty="0"/>
+              <a:t>    var blog = </a:t>
+            </a:r>
+            <a:r>
+              <a:rPr lang="cs-CZ" dirty="0" err="1"/>
+              <a:t>new</a:t>
+            </a:r>
+            <a:r>
+              <a:rPr lang="cs-CZ" dirty="0"/>
+              <a:t> Blog { Name = "ADO.NET Blog" };</a:t>
+            </a:r>
+          </a:p>
+          <a:p>
+            <a:r>
+              <a:rPr lang="cs-CZ" dirty="0"/>
+              <a:t>    </a:t>
+            </a:r>
+            <a:r>
+              <a:rPr lang="cs-CZ" dirty="0" err="1">
+                <a:solidFill>
+                  <a:srgbClr val="FF0000"/>
+                </a:solidFill>
+              </a:rPr>
+              <a:t>context.Entry</a:t>
+            </a:r>
+            <a:r>
+              <a:rPr lang="cs-CZ" dirty="0">
+                <a:solidFill>
+                  <a:srgbClr val="FF0000"/>
+                </a:solidFill>
+              </a:rPr>
+              <a:t>(blog).</a:t>
+            </a:r>
+            <a:r>
+              <a:rPr lang="cs-CZ" dirty="0" err="1">
+                <a:solidFill>
+                  <a:srgbClr val="FF0000"/>
+                </a:solidFill>
+              </a:rPr>
+              <a:t>State</a:t>
+            </a:r>
+            <a:r>
+              <a:rPr lang="cs-CZ" dirty="0">
+                <a:solidFill>
+                  <a:srgbClr val="FF0000"/>
+                </a:solidFill>
+              </a:rPr>
+              <a:t> = </a:t>
+            </a:r>
+            <a:r>
+              <a:rPr lang="cs-CZ" dirty="0" err="1">
+                <a:solidFill>
+                  <a:srgbClr val="FF0000"/>
+                </a:solidFill>
+              </a:rPr>
+              <a:t>EntityState.Added</a:t>
+            </a:r>
+            <a:r>
+              <a:rPr lang="cs-CZ" dirty="0">
+                <a:solidFill>
+                  <a:srgbClr val="FF0000"/>
+                </a:solidFill>
+              </a:rPr>
+              <a:t>;</a:t>
+            </a:r>
+          </a:p>
+          <a:p>
+            <a:r>
+              <a:rPr lang="cs-CZ" dirty="0"/>
+              <a:t>    </a:t>
+            </a:r>
+            <a:r>
+              <a:rPr lang="cs-CZ" dirty="0" err="1"/>
+              <a:t>context.SaveChanges</a:t>
+            </a:r>
+            <a:r>
+              <a:rPr lang="cs-CZ" dirty="0"/>
+              <a:t>();</a:t>
+            </a:r>
+          </a:p>
+          <a:p>
+            <a:r>
+              <a:rPr lang="cs-CZ" dirty="0"/>
+              <a:t>}</a:t>
+            </a:r>
+          </a:p>
+        </p:txBody>
+      </p:sp>
+    </p:spTree>
+    <p:extLst>
+      <p:ext uri="{BB962C8B-B14F-4D97-AF65-F5344CB8AC3E}">
+        <p14:creationId xmlns:p14="http://schemas.microsoft.com/office/powerpoint/2010/main" val="2737292416"/>
+      </p:ext>
+    </p:extLst>
+  </p:cSld>
+  <p:clrMapOvr>
+    <a:masterClrMapping/>
+  </p:clrMapOvr>
+  <mc:AlternateContent xmlns:mc="http://schemas.openxmlformats.org/markup-compatibility/2006" xmlns:p14="http://schemas.microsoft.com/office/powerpoint/2010/main">
+    <mc:Choice Requires="p14">
+      <p:transition spd="slow" p14:dur="1300">
+        <p14:pan dir="u"/>
+      </p:transition>
+    </mc:Choice>
+    <mc:Fallback xmlns="">
+      <p:transition spd="slow">
+        <p:fade/>
+      </p:transition>
+    </mc:Fallback>
+  </mc:AlternateContent>
+</p:sld>
+</file>
+
+<file path=ppt/slides/slide26.xml><?xml version="1.0" encoding="utf-8"?>
+<p:sld xmlns:a="http://schemas.openxmlformats.org/drawingml/2006/main" xmlns:r="http://schemas.openxmlformats.org/officeDocument/2006/relationships" xmlns:p="http://schemas.openxmlformats.org/presentationml/2006/main">
+  <p:cSld>
+    <p:bg>
+      <p:bgPr>
+        <a:solidFill>
+          <a:schemeClr val="bg1"/>
+        </a:solidFill>
+        <a:effectLst/>
+      </p:bgPr>
+    </p:bg>
+    <p:spTree>
+      <p:nvGrpSpPr>
+        <p:cNvPr id="1" name=""/>
+        <p:cNvGrpSpPr/>
+        <p:nvPr/>
+      </p:nvGrpSpPr>
+      <p:grpSpPr>
+        <a:xfrm>
+          <a:off x="0" y="0"/>
+          <a:ext cx="0" cy="0"/>
+          <a:chOff x="0" y="0"/>
+          <a:chExt cx="0" cy="0"/>
+        </a:xfrm>
+      </p:grpSpPr>
+      <p:pic>
+        <p:nvPicPr>
+          <p:cNvPr id="18" name="Picture 8" descr="http://emanuelscirlet.com/uploads/powered/stdntpartner.bmp"/>
+          <p:cNvPicPr>
+            <a:picLocks noChangeAspect="1" noChangeArrowheads="1"/>
+          </p:cNvPicPr>
+          <p:nvPr/>
+        </p:nvPicPr>
+        <p:blipFill>
+          <a:blip r:embed="rId2" cstate="print">
+            <a:extLst>
+              <a:ext uri="{28A0092B-C50C-407E-A947-70E740481C1C}">
+                <a14:useLocalDpi xmlns:a14="http://schemas.microsoft.com/office/drawing/2010/main" val="0"/>
+              </a:ext>
+            </a:extLst>
+          </a:blip>
+          <a:srcRect/>
+          <a:stretch>
+            <a:fillRect/>
+          </a:stretch>
+        </p:blipFill>
+        <p:spPr bwMode="auto">
+          <a:xfrm>
+            <a:off x="8388969" y="12294552"/>
+            <a:ext cx="1073175" cy="200326"/>
+          </a:xfrm>
+          <a:prstGeom prst="rect">
+            <a:avLst/>
+          </a:prstGeom>
+          <a:noFill/>
+          <a:extLst>
+            <a:ext uri="{909E8E84-426E-40DD-AFC4-6F175D3DCCD1}">
+              <a14:hiddenFill xmlns:a14="http://schemas.microsoft.com/office/drawing/2010/main">
+                <a:solidFill>
+                  <a:srgbClr val="FFFFFF"/>
+                </a:solidFill>
+              </a14:hiddenFill>
+            </a:ext>
+          </a:extLst>
+        </p:spPr>
+      </p:pic>
+      <p:sp>
+        <p:nvSpPr>
+          <p:cNvPr id="21" name="TextBox 20"/>
+          <p:cNvSpPr txBox="1"/>
+          <p:nvPr/>
+        </p:nvSpPr>
+        <p:spPr>
+          <a:xfrm>
+            <a:off x="660363" y="694083"/>
+            <a:ext cx="8886446" cy="987706"/>
+          </a:xfrm>
+          <a:prstGeom prst="rect">
+            <a:avLst/>
+          </a:prstGeom>
+          <a:noFill/>
+        </p:spPr>
+        <p:txBody>
+          <a:bodyPr wrap="square" rtlCol="0">
+            <a:spAutoFit/>
+          </a:bodyPr>
+          <a:lstStyle/>
+          <a:p>
+            <a:pPr>
+              <a:lnSpc>
+                <a:spcPct val="130000"/>
+              </a:lnSpc>
+            </a:pPr>
+            <a:r>
               <a:rPr lang="cs-CZ" sz="5000" b="1" dirty="0">
                 <a:latin typeface="Segoe UI Light" panose="020B0502040204020203" pitchFamily="34" charset="0"/>
                 <a:cs typeface="Segoe UI Light" panose="020B0502040204020203" pitchFamily="34" charset="0"/>
@@ -10968,7 +13835,7 @@
 </p:sld>
 </file>
 
-<file path=ppt/slides/slide23.xml><?xml version="1.0" encoding="utf-8"?>
+<file path=ppt/slides/slide27.xml><?xml version="1.0" encoding="utf-8"?>
 <p:sld xmlns:a="http://schemas.openxmlformats.org/drawingml/2006/main" xmlns:r="http://schemas.openxmlformats.org/officeDocument/2006/relationships" xmlns:p="http://schemas.openxmlformats.org/presentationml/2006/main">
   <p:cSld>
     <p:bg>

</xml_diff>